<commit_message>
Updated slide deck for OMG meeting 	modified:   docs/Threat Modeling and Sharing-20140326.pptx
</commit_message>
<xml_diff>
--- a/docs/Threat Modeling and Sharing-20140326.pptx
+++ b/docs/Threat Modeling and Sharing-20140326.pptx
@@ -5,7 +5,7 @@
     <p:sldMasterId id="2147483648" r:id="rId1"/>
   </p:sldMasterIdLst>
   <p:notesMasterIdLst>
-    <p:notesMasterId r:id="rId23"/>
+    <p:notesMasterId r:id="rId28"/>
   </p:notesMasterIdLst>
   <p:sldIdLst>
     <p:sldId id="258" r:id="rId2"/>
@@ -16,19 +16,24 @@
     <p:sldId id="289" r:id="rId7"/>
     <p:sldId id="290" r:id="rId8"/>
     <p:sldId id="291" r:id="rId9"/>
-    <p:sldId id="292" r:id="rId10"/>
-    <p:sldId id="272" r:id="rId11"/>
-    <p:sldId id="278" r:id="rId12"/>
-    <p:sldId id="266" r:id="rId13"/>
-    <p:sldId id="268" r:id="rId14"/>
-    <p:sldId id="288" r:id="rId15"/>
-    <p:sldId id="281" r:id="rId16"/>
-    <p:sldId id="282" r:id="rId17"/>
-    <p:sldId id="283" r:id="rId18"/>
-    <p:sldId id="284" r:id="rId19"/>
-    <p:sldId id="285" r:id="rId20"/>
-    <p:sldId id="286" r:id="rId21"/>
-    <p:sldId id="287" r:id="rId22"/>
+    <p:sldId id="293" r:id="rId10"/>
+    <p:sldId id="292" r:id="rId11"/>
+    <p:sldId id="294" r:id="rId12"/>
+    <p:sldId id="296" r:id="rId13"/>
+    <p:sldId id="297" r:id="rId14"/>
+    <p:sldId id="295" r:id="rId15"/>
+    <p:sldId id="272" r:id="rId16"/>
+    <p:sldId id="278" r:id="rId17"/>
+    <p:sldId id="266" r:id="rId18"/>
+    <p:sldId id="268" r:id="rId19"/>
+    <p:sldId id="288" r:id="rId20"/>
+    <p:sldId id="281" r:id="rId21"/>
+    <p:sldId id="282" r:id="rId22"/>
+    <p:sldId id="283" r:id="rId23"/>
+    <p:sldId id="284" r:id="rId24"/>
+    <p:sldId id="285" r:id="rId25"/>
+    <p:sldId id="286" r:id="rId26"/>
+    <p:sldId id="287" r:id="rId27"/>
   </p:sldIdLst>
   <p:sldSz cx="9144000" cy="6858000" type="screen4x3"/>
   <p:notesSz cx="6858000" cy="9144000"/>
@@ -3501,20 +3506,59 @@
             <p:ph type="subTitle" idx="1"/>
           </p:nvPr>
         </p:nvSpPr>
-        <p:spPr/>
+        <p:spPr>
+          <a:xfrm>
+            <a:off x="824875" y="3886200"/>
+            <a:ext cx="7528620" cy="1752600"/>
+          </a:xfrm>
+        </p:spPr>
         <p:txBody>
           <a:bodyPr/>
           <a:lstStyle/>
           <a:p>
             <a:r>
               <a:rPr lang="en-US" dirty="0" smtClean="0"/>
-              <a:t>Gerald Beuchelt</a:t>
-            </a:r>
-          </a:p>
-          <a:p>
-            <a:r>
-              <a:rPr lang="en-US" dirty="0" smtClean="0"/>
-              <a:t>Demandware, Inc.</a:t>
+              <a:t>Gerald </a:t>
+            </a:r>
+            <a:r>
+              <a:rPr lang="en-US" dirty="0" smtClean="0"/>
+              <a:t>Beuchelt, Demandware</a:t>
+            </a:r>
+            <a:r>
+              <a:rPr lang="en-US" dirty="0" smtClean="0"/>
+              <a:t>, Inc</a:t>
+            </a:r>
+            <a:r>
+              <a:rPr lang="en-US" dirty="0" smtClean="0"/>
+              <a:t>.</a:t>
+            </a:r>
+          </a:p>
+          <a:p>
+            <a:r>
+              <a:rPr lang="en-US" dirty="0" smtClean="0"/>
+              <a:t>Cory </a:t>
+            </a:r>
+            <a:r>
+              <a:rPr lang="en-US" dirty="0" err="1" smtClean="0"/>
+              <a:t>Casanave</a:t>
+            </a:r>
+            <a:r>
+              <a:rPr lang="en-US" dirty="0" smtClean="0"/>
+              <a:t>, Model-Driven Solutions</a:t>
+            </a:r>
+          </a:p>
+          <a:p>
+            <a:r>
+              <a:rPr lang="en-US" dirty="0" smtClean="0"/>
+              <a:t>Justin </a:t>
+            </a:r>
+            <a:r>
+              <a:rPr lang="en-US" dirty="0" err="1" smtClean="0"/>
+              <a:t>Stekervetz</a:t>
+            </a:r>
+            <a:r>
+              <a:rPr lang="en-US" dirty="0" smtClean="0"/>
+              <a:t>, DHS</a:t>
             </a:r>
             <a:endParaRPr lang="en-US" dirty="0"/>
           </a:p>
@@ -3574,7 +3618,7 @@
           <a:p>
             <a:r>
               <a:rPr lang="en-US" dirty="0" smtClean="0"/>
-              <a:t>Use Case: Large Company</a:t>
+              <a:t>Overview Mapping to STIX and NIEM</a:t>
             </a:r>
             <a:endParaRPr lang="en-US" dirty="0"/>
           </a:p>
@@ -3582,80 +3626,40 @@
       </p:sp>
       <p:sp>
         <p:nvSpPr>
-          <p:cNvPr id="3" name="Content Placeholder 2"/>
+          <p:cNvPr id="3" name="Text Placeholder 2"/>
           <p:cNvSpPr>
             <a:spLocks noGrp="1"/>
           </p:cNvSpPr>
           <p:nvPr>
-            <p:ph idx="1"/>
+            <p:ph type="body" idx="1"/>
           </p:nvPr>
         </p:nvSpPr>
         <p:spPr/>
         <p:txBody>
-          <a:bodyPr>
-            <a:normAutofit fontScale="92500" lnSpcReduction="20000"/>
-          </a:bodyPr>
+          <a:bodyPr/>
           <a:lstStyle/>
           <a:p>
-            <a:r>
-              <a:rPr lang="en-US" dirty="0" smtClean="0"/>
-              <a:t>Company with multiple datacenters, office facilities, international business activity</a:t>
-            </a:r>
-          </a:p>
-          <a:p>
-            <a:r>
-              <a:rPr lang="en-US" dirty="0" smtClean="0"/>
-              <a:t>Large number of deployed security systems, sensors</a:t>
-            </a:r>
-          </a:p>
-          <a:p>
-            <a:pPr lvl="1"/>
-            <a:r>
-              <a:rPr lang="en-US" dirty="0" smtClean="0"/>
-              <a:t>Firewalls, IDS/IPS, SIEM, monitoring systems, notification/alerting, etc. </a:t>
-            </a:r>
-          </a:p>
-          <a:p>
-            <a:pPr lvl="1"/>
-            <a:r>
-              <a:rPr lang="en-US" dirty="0" smtClean="0"/>
-              <a:t>Uses FW/Snort rules, STIX/TAXII, </a:t>
-            </a:r>
-            <a:r>
-              <a:rPr lang="en-US" dirty="0" err="1" smtClean="0"/>
-              <a:t>IODef</a:t>
-            </a:r>
-            <a:r>
-              <a:rPr lang="en-US" dirty="0" smtClean="0"/>
-              <a:t>, alarms for fire and intrusions, etc. </a:t>
-            </a:r>
-          </a:p>
-          <a:p>
-            <a:pPr lvl="1"/>
-            <a:r>
-              <a:rPr lang="en-US" dirty="0" smtClean="0"/>
-              <a:t>Physical and information security staff, some 24/7</a:t>
-            </a:r>
-          </a:p>
-          <a:p>
-            <a:r>
-              <a:rPr lang="en-US" dirty="0" smtClean="0"/>
-              <a:t>Interoperable (but not uniform) threat monitoring and assessment</a:t>
-            </a:r>
-            <a:endParaRPr lang="en-US" dirty="0"/>
+            <a:endParaRPr lang="en-US"/>
           </a:p>
         </p:txBody>
       </p:sp>
     </p:spTree>
     <p:extLst>
       <p:ext uri="{BB962C8B-B14F-4D97-AF65-F5344CB8AC3E}">
-        <p14:creationId xmlns:p14="http://schemas.microsoft.com/office/powerpoint/2010/main" val="745674518"/>
+        <p14:creationId xmlns:p14="http://schemas.microsoft.com/office/powerpoint/2010/main" val="1784324374"/>
       </p:ext>
     </p:extLst>
   </p:cSld>
   <p:clrMapOvr>
     <a:masterClrMapping/>
   </p:clrMapOvr>
+  <p:timing>
+    <p:tnLst>
+      <p:par>
+        <p:cTn xmlns:p14="http://schemas.microsoft.com/office/powerpoint/2010/main" id="1" dur="indefinite" restart="never" nodeType="tmRoot"/>
+      </p:par>
+    </p:tnLst>
+  </p:timing>
 </p:sld>
 </file>
 
@@ -3676,6 +3680,403 @@
           <a:chExt cx="0" cy="0"/>
         </a:xfrm>
       </p:grpSpPr>
+      <p:pic>
+        <p:nvPicPr>
+          <p:cNvPr id="4" name="Picture 3" descr="STIX-Conceptual Mapping-20140326.jpg"/>
+          <p:cNvPicPr>
+            <a:picLocks noChangeAspect="1"/>
+          </p:cNvPicPr>
+          <p:nvPr/>
+        </p:nvPicPr>
+        <p:blipFill rotWithShape="1">
+          <a:blip r:embed="rId2">
+            <a:extLst>
+              <a:ext uri="{28A0092B-C50C-407E-A947-70E740481C1C}">
+                <a14:useLocalDpi xmlns:a14="http://schemas.microsoft.com/office/drawing/2010/main" val="0"/>
+              </a:ext>
+            </a:extLst>
+          </a:blip>
+          <a:srcRect l="638" t="7540" r="8441" b="1617"/>
+          <a:stretch/>
+        </p:blipFill>
+        <p:spPr>
+          <a:xfrm>
+            <a:off x="0" y="962526"/>
+            <a:ext cx="9151531" cy="4841604"/>
+          </a:xfrm>
+          <a:prstGeom prst="rect">
+            <a:avLst/>
+          </a:prstGeom>
+        </p:spPr>
+      </p:pic>
+    </p:spTree>
+    <p:extLst>
+      <p:ext uri="{BB962C8B-B14F-4D97-AF65-F5344CB8AC3E}">
+        <p14:creationId xmlns:p14="http://schemas.microsoft.com/office/powerpoint/2010/main" val="3676462093"/>
+      </p:ext>
+    </p:extLst>
+  </p:cSld>
+  <p:clrMapOvr>
+    <a:masterClrMapping/>
+  </p:clrMapOvr>
+  <p:timing>
+    <p:tnLst>
+      <p:par>
+        <p:cTn xmlns:p14="http://schemas.microsoft.com/office/powerpoint/2010/main" id="1" dur="indefinite" restart="never" nodeType="tmRoot"/>
+      </p:par>
+    </p:tnLst>
+  </p:timing>
+</p:sld>
+</file>
+
+<file path=ppt/slides/slide12.xml><?xml version="1.0" encoding="utf-8"?>
+<p:sld xmlns:a="http://schemas.openxmlformats.org/drawingml/2006/main" xmlns:r="http://schemas.openxmlformats.org/officeDocument/2006/relationships" xmlns:p="http://schemas.openxmlformats.org/presentationml/2006/main">
+  <p:cSld>
+    <p:spTree>
+      <p:nvGrpSpPr>
+        <p:cNvPr id="1" name=""/>
+        <p:cNvGrpSpPr/>
+        <p:nvPr/>
+      </p:nvGrpSpPr>
+      <p:grpSpPr>
+        <a:xfrm>
+          <a:off x="0" y="0"/>
+          <a:ext cx="0" cy="0"/>
+          <a:chOff x="0" y="0"/>
+          <a:chExt cx="0" cy="0"/>
+        </a:xfrm>
+      </p:grpSpPr>
+      <p:pic>
+        <p:nvPicPr>
+          <p:cNvPr id="2" name="Picture 1" descr="NIEM Mapping.jpg"/>
+          <p:cNvPicPr>
+            <a:picLocks noChangeAspect="1"/>
+          </p:cNvPicPr>
+          <p:nvPr/>
+        </p:nvPicPr>
+        <p:blipFill rotWithShape="1">
+          <a:blip r:embed="rId2">
+            <a:extLst>
+              <a:ext uri="{28A0092B-C50C-407E-A947-70E740481C1C}">
+                <a14:useLocalDpi xmlns:a14="http://schemas.microsoft.com/office/drawing/2010/main" val="0"/>
+              </a:ext>
+            </a:extLst>
+          </a:blip>
+          <a:srcRect l="1152" t="6319" r="18334" b="757"/>
+          <a:stretch/>
+        </p:blipFill>
+        <p:spPr>
+          <a:xfrm>
+            <a:off x="0" y="711156"/>
+            <a:ext cx="9144000" cy="5896042"/>
+          </a:xfrm>
+          <a:prstGeom prst="rect">
+            <a:avLst/>
+          </a:prstGeom>
+        </p:spPr>
+      </p:pic>
+    </p:spTree>
+    <p:extLst>
+      <p:ext uri="{BB962C8B-B14F-4D97-AF65-F5344CB8AC3E}">
+        <p14:creationId xmlns:p14="http://schemas.microsoft.com/office/powerpoint/2010/main" val="1179801868"/>
+      </p:ext>
+    </p:extLst>
+  </p:cSld>
+  <p:clrMapOvr>
+    <a:masterClrMapping/>
+  </p:clrMapOvr>
+  <p:timing>
+    <p:tnLst>
+      <p:par>
+        <p:cTn xmlns:p14="http://schemas.microsoft.com/office/powerpoint/2010/main" id="1" dur="indefinite" restart="never" nodeType="tmRoot"/>
+      </p:par>
+    </p:tnLst>
+  </p:timing>
+</p:sld>
+</file>
+
+<file path=ppt/slides/slide13.xml><?xml version="1.0" encoding="utf-8"?>
+<p:sld xmlns:a="http://schemas.openxmlformats.org/drawingml/2006/main" xmlns:r="http://schemas.openxmlformats.org/officeDocument/2006/relationships" xmlns:p="http://schemas.openxmlformats.org/presentationml/2006/main">
+  <p:cSld>
+    <p:spTree>
+      <p:nvGrpSpPr>
+        <p:cNvPr id="1" name=""/>
+        <p:cNvGrpSpPr/>
+        <p:nvPr/>
+      </p:nvGrpSpPr>
+      <p:grpSpPr>
+        <a:xfrm>
+          <a:off x="0" y="0"/>
+          <a:ext cx="0" cy="0"/>
+          <a:chOff x="0" y="0"/>
+          <a:chExt cx="0" cy="0"/>
+        </a:xfrm>
+      </p:grpSpPr>
+      <p:sp>
+        <p:nvSpPr>
+          <p:cNvPr id="2" name="Title 1"/>
+          <p:cNvSpPr>
+            <a:spLocks noGrp="1"/>
+          </p:cNvSpPr>
+          <p:nvPr>
+            <p:ph type="title"/>
+          </p:nvPr>
+        </p:nvSpPr>
+        <p:spPr/>
+        <p:txBody>
+          <a:bodyPr/>
+          <a:lstStyle/>
+          <a:p>
+            <a:r>
+              <a:rPr lang="en-US" dirty="0" smtClean="0"/>
+              <a:t>Use Case Work</a:t>
+            </a:r>
+            <a:endParaRPr lang="en-US" dirty="0"/>
+          </a:p>
+        </p:txBody>
+      </p:sp>
+      <p:sp>
+        <p:nvSpPr>
+          <p:cNvPr id="3" name="Text Placeholder 2"/>
+          <p:cNvSpPr>
+            <a:spLocks noGrp="1"/>
+          </p:cNvSpPr>
+          <p:nvPr>
+            <p:ph type="body" idx="1"/>
+          </p:nvPr>
+        </p:nvSpPr>
+        <p:spPr/>
+        <p:txBody>
+          <a:bodyPr/>
+          <a:lstStyle/>
+          <a:p>
+            <a:endParaRPr lang="en-US"/>
+          </a:p>
+        </p:txBody>
+      </p:sp>
+    </p:spTree>
+    <p:extLst>
+      <p:ext uri="{BB962C8B-B14F-4D97-AF65-F5344CB8AC3E}">
+        <p14:creationId xmlns:p14="http://schemas.microsoft.com/office/powerpoint/2010/main" val="2887878283"/>
+      </p:ext>
+    </p:extLst>
+  </p:cSld>
+  <p:clrMapOvr>
+    <a:masterClrMapping/>
+  </p:clrMapOvr>
+</p:sld>
+</file>
+
+<file path=ppt/slides/slide14.xml><?xml version="1.0" encoding="utf-8"?>
+<p:sld xmlns:a="http://schemas.openxmlformats.org/drawingml/2006/main" xmlns:r="http://schemas.openxmlformats.org/officeDocument/2006/relationships" xmlns:p="http://schemas.openxmlformats.org/presentationml/2006/main">
+  <p:cSld>
+    <p:spTree>
+      <p:nvGrpSpPr>
+        <p:cNvPr id="1" name=""/>
+        <p:cNvGrpSpPr/>
+        <p:nvPr/>
+      </p:nvGrpSpPr>
+      <p:grpSpPr>
+        <a:xfrm>
+          <a:off x="0" y="0"/>
+          <a:ext cx="0" cy="0"/>
+          <a:chOff x="0" y="0"/>
+          <a:chExt cx="0" cy="0"/>
+        </a:xfrm>
+      </p:grpSpPr>
+      <p:pic>
+        <p:nvPicPr>
+          <p:cNvPr id="4" name="Picture 3" descr="Generic Threat Modeling-20140326.png"/>
+          <p:cNvPicPr>
+            <a:picLocks noChangeAspect="1"/>
+          </p:cNvPicPr>
+          <p:nvPr/>
+        </p:nvPicPr>
+        <p:blipFill>
+          <a:blip r:embed="rId2">
+            <a:extLst>
+              <a:ext uri="{28A0092B-C50C-407E-A947-70E740481C1C}">
+                <a14:useLocalDpi xmlns:a14="http://schemas.microsoft.com/office/drawing/2010/main" val="0"/>
+              </a:ext>
+            </a:extLst>
+          </a:blip>
+          <a:stretch>
+            <a:fillRect/>
+          </a:stretch>
+        </p:blipFill>
+        <p:spPr>
+          <a:xfrm>
+            <a:off x="183305" y="0"/>
+            <a:ext cx="8706941" cy="6858000"/>
+          </a:xfrm>
+          <a:prstGeom prst="rect">
+            <a:avLst/>
+          </a:prstGeom>
+        </p:spPr>
+      </p:pic>
+    </p:spTree>
+    <p:extLst>
+      <p:ext uri="{BB962C8B-B14F-4D97-AF65-F5344CB8AC3E}">
+        <p14:creationId xmlns:p14="http://schemas.microsoft.com/office/powerpoint/2010/main" val="86004446"/>
+      </p:ext>
+    </p:extLst>
+  </p:cSld>
+  <p:clrMapOvr>
+    <a:masterClrMapping/>
+  </p:clrMapOvr>
+  <p:timing>
+    <p:tnLst>
+      <p:par>
+        <p:cTn xmlns:p14="http://schemas.microsoft.com/office/powerpoint/2010/main" id="1" dur="indefinite" restart="never" nodeType="tmRoot"/>
+      </p:par>
+    </p:tnLst>
+  </p:timing>
+</p:sld>
+</file>
+
+<file path=ppt/slides/slide15.xml><?xml version="1.0" encoding="utf-8"?>
+<p:sld xmlns:a="http://schemas.openxmlformats.org/drawingml/2006/main" xmlns:r="http://schemas.openxmlformats.org/officeDocument/2006/relationships" xmlns:p="http://schemas.openxmlformats.org/presentationml/2006/main">
+  <p:cSld>
+    <p:spTree>
+      <p:nvGrpSpPr>
+        <p:cNvPr id="1" name=""/>
+        <p:cNvGrpSpPr/>
+        <p:nvPr/>
+      </p:nvGrpSpPr>
+      <p:grpSpPr>
+        <a:xfrm>
+          <a:off x="0" y="0"/>
+          <a:ext cx="0" cy="0"/>
+          <a:chOff x="0" y="0"/>
+          <a:chExt cx="0" cy="0"/>
+        </a:xfrm>
+      </p:grpSpPr>
+      <p:sp>
+        <p:nvSpPr>
+          <p:cNvPr id="2" name="Title 1"/>
+          <p:cNvSpPr>
+            <a:spLocks noGrp="1"/>
+          </p:cNvSpPr>
+          <p:nvPr>
+            <p:ph type="title"/>
+          </p:nvPr>
+        </p:nvSpPr>
+        <p:spPr/>
+        <p:txBody>
+          <a:bodyPr/>
+          <a:lstStyle/>
+          <a:p>
+            <a:r>
+              <a:rPr lang="en-US" dirty="0" smtClean="0"/>
+              <a:t>Use Case: Large Company</a:t>
+            </a:r>
+            <a:endParaRPr lang="en-US" dirty="0"/>
+          </a:p>
+        </p:txBody>
+      </p:sp>
+      <p:sp>
+        <p:nvSpPr>
+          <p:cNvPr id="3" name="Content Placeholder 2"/>
+          <p:cNvSpPr>
+            <a:spLocks noGrp="1"/>
+          </p:cNvSpPr>
+          <p:nvPr>
+            <p:ph idx="1"/>
+          </p:nvPr>
+        </p:nvSpPr>
+        <p:spPr/>
+        <p:txBody>
+          <a:bodyPr>
+            <a:normAutofit fontScale="92500" lnSpcReduction="20000"/>
+          </a:bodyPr>
+          <a:lstStyle/>
+          <a:p>
+            <a:r>
+              <a:rPr lang="en-US" dirty="0" smtClean="0"/>
+              <a:t>Company with multiple datacenters, office facilities, international business activity</a:t>
+            </a:r>
+          </a:p>
+          <a:p>
+            <a:r>
+              <a:rPr lang="en-US" dirty="0" smtClean="0"/>
+              <a:t>Large number of deployed security systems, sensors</a:t>
+            </a:r>
+          </a:p>
+          <a:p>
+            <a:pPr lvl="1"/>
+            <a:r>
+              <a:rPr lang="en-US" dirty="0" smtClean="0"/>
+              <a:t>Firewalls, IDS/IPS, SIEM, monitoring systems, notification/alerting, etc. </a:t>
+            </a:r>
+          </a:p>
+          <a:p>
+            <a:pPr lvl="1"/>
+            <a:r>
+              <a:rPr lang="en-US" dirty="0" smtClean="0"/>
+              <a:t>Uses FW/Snort rules, STIX/TAXII, </a:t>
+            </a:r>
+            <a:r>
+              <a:rPr lang="en-US" dirty="0" err="1" smtClean="0"/>
+              <a:t>IODef</a:t>
+            </a:r>
+            <a:r>
+              <a:rPr lang="en-US" dirty="0" smtClean="0"/>
+              <a:t>, alarms for fire and intrusions, etc. </a:t>
+            </a:r>
+          </a:p>
+          <a:p>
+            <a:pPr lvl="1"/>
+            <a:r>
+              <a:rPr lang="en-US" dirty="0" smtClean="0"/>
+              <a:t>Physical and information security staff, some 24/7</a:t>
+            </a:r>
+          </a:p>
+          <a:p>
+            <a:r>
+              <a:rPr lang="en-US" dirty="0" smtClean="0"/>
+              <a:t>Interoperable (but not uniform) threat monitoring and assessment</a:t>
+            </a:r>
+            <a:endParaRPr lang="en-US" dirty="0"/>
+          </a:p>
+        </p:txBody>
+      </p:sp>
+    </p:spTree>
+    <p:extLst>
+      <p:ext uri="{BB962C8B-B14F-4D97-AF65-F5344CB8AC3E}">
+        <p14:creationId xmlns:p14="http://schemas.microsoft.com/office/powerpoint/2010/main" val="745674518"/>
+      </p:ext>
+    </p:extLst>
+  </p:cSld>
+  <p:clrMapOvr>
+    <a:masterClrMapping/>
+  </p:clrMapOvr>
+  <p:timing>
+    <p:tnLst>
+      <p:par>
+        <p:cTn xmlns:p14="http://schemas.microsoft.com/office/powerpoint/2010/main" id="1" dur="indefinite" restart="never" nodeType="tmRoot"/>
+      </p:par>
+    </p:tnLst>
+  </p:timing>
+</p:sld>
+</file>
+
+<file path=ppt/slides/slide16.xml><?xml version="1.0" encoding="utf-8"?>
+<p:sld xmlns:a="http://schemas.openxmlformats.org/drawingml/2006/main" xmlns:r="http://schemas.openxmlformats.org/officeDocument/2006/relationships" xmlns:p="http://schemas.openxmlformats.org/presentationml/2006/main">
+  <p:cSld>
+    <p:spTree>
+      <p:nvGrpSpPr>
+        <p:cNvPr id="1" name=""/>
+        <p:cNvGrpSpPr/>
+        <p:nvPr/>
+      </p:nvGrpSpPr>
+      <p:grpSpPr>
+        <a:xfrm>
+          <a:off x="0" y="0"/>
+          <a:ext cx="0" cy="0"/>
+          <a:chOff x="0" y="0"/>
+          <a:chExt cx="0" cy="0"/>
+        </a:xfrm>
+      </p:grpSpPr>
       <p:sp>
         <p:nvSpPr>
           <p:cNvPr id="2" name="Title 1"/>
@@ -3746,10 +4147,17 @@
   <p:clrMapOvr>
     <a:masterClrMapping/>
   </p:clrMapOvr>
+  <p:timing>
+    <p:tnLst>
+      <p:par>
+        <p:cTn xmlns:p14="http://schemas.microsoft.com/office/powerpoint/2010/main" id="1" dur="indefinite" restart="never" nodeType="tmRoot"/>
+      </p:par>
+    </p:tnLst>
+  </p:timing>
 </p:sld>
 </file>
 
-<file path=ppt/slides/slide12.xml><?xml version="1.0" encoding="utf-8"?>
+<file path=ppt/slides/slide17.xml><?xml version="1.0" encoding="utf-8"?>
 <p:sld xmlns:a="http://schemas.openxmlformats.org/drawingml/2006/main" xmlns:r="http://schemas.openxmlformats.org/officeDocument/2006/relationships" xmlns:p="http://schemas.openxmlformats.org/presentationml/2006/main">
   <p:cSld>
     <p:spTree>
@@ -3870,588 +4278,6 @@
 </p:sld>
 </file>
 
-<file path=ppt/slides/slide13.xml><?xml version="1.0" encoding="utf-8"?>
-<p:sld xmlns:a="http://schemas.openxmlformats.org/drawingml/2006/main" xmlns:r="http://schemas.openxmlformats.org/officeDocument/2006/relationships" xmlns:p="http://schemas.openxmlformats.org/presentationml/2006/main">
-  <p:cSld>
-    <p:spTree>
-      <p:nvGrpSpPr>
-        <p:cNvPr id="1" name=""/>
-        <p:cNvGrpSpPr/>
-        <p:nvPr/>
-      </p:nvGrpSpPr>
-      <p:grpSpPr>
-        <a:xfrm>
-          <a:off x="0" y="0"/>
-          <a:ext cx="0" cy="0"/>
-          <a:chOff x="0" y="0"/>
-          <a:chExt cx="0" cy="0"/>
-        </a:xfrm>
-      </p:grpSpPr>
-      <p:sp>
-        <p:nvSpPr>
-          <p:cNvPr id="3" name="Title 2"/>
-          <p:cNvSpPr>
-            <a:spLocks noGrp="1"/>
-          </p:cNvSpPr>
-          <p:nvPr>
-            <p:ph type="title"/>
-          </p:nvPr>
-        </p:nvSpPr>
-        <p:spPr/>
-        <p:txBody>
-          <a:bodyPr/>
-          <a:lstStyle/>
-          <a:p>
-            <a:r>
-              <a:rPr lang="en-US" dirty="0" smtClean="0"/>
-              <a:t>More Information	</a:t>
-            </a:r>
-            <a:endParaRPr lang="en-US" dirty="0"/>
-          </a:p>
-        </p:txBody>
-      </p:sp>
-      <p:sp>
-        <p:nvSpPr>
-          <p:cNvPr id="4" name="Content Placeholder 3"/>
-          <p:cNvSpPr>
-            <a:spLocks noGrp="1"/>
-          </p:cNvSpPr>
-          <p:nvPr>
-            <p:ph idx="1"/>
-          </p:nvPr>
-        </p:nvSpPr>
-        <p:spPr/>
-        <p:txBody>
-          <a:bodyPr/>
-          <a:lstStyle/>
-          <a:p>
-            <a:r>
-              <a:rPr lang="en-US" dirty="0" smtClean="0"/>
-              <a:t>Email list</a:t>
-            </a:r>
-            <a:br>
-              <a:rPr lang="en-US" dirty="0" smtClean="0"/>
-            </a:br>
-            <a:r>
-              <a:rPr lang="en-US" dirty="0" smtClean="0">
-                <a:hlinkClick r:id="rId2"/>
-              </a:rPr>
-              <a:t>threat-modeling@omg.org</a:t>
-            </a:r>
-            <a:endParaRPr lang="en-US" dirty="0" smtClean="0"/>
-          </a:p>
-          <a:p>
-            <a:r>
-              <a:rPr lang="en-US" dirty="0" smtClean="0"/>
-              <a:t>(Subscription via </a:t>
-            </a:r>
-            <a:r>
-              <a:rPr lang="en-US" dirty="0" smtClean="0">
-                <a:hlinkClick r:id="rId3"/>
-              </a:rPr>
-              <a:t>request@omg.org</a:t>
-            </a:r>
-            <a:r>
-              <a:rPr lang="en-US" dirty="0" smtClean="0"/>
-              <a:t>)</a:t>
-            </a:r>
-          </a:p>
-          <a:p>
-            <a:endParaRPr lang="en-US" dirty="0"/>
-          </a:p>
-          <a:p>
-            <a:r>
-              <a:rPr lang="en-US" dirty="0" err="1" smtClean="0"/>
-              <a:t>GitHub</a:t>
-            </a:r>
-            <a:r>
-              <a:rPr lang="en-US" dirty="0" smtClean="0"/>
-              <a:t> Pages</a:t>
-            </a:r>
-            <a:br>
-              <a:rPr lang="en-US" dirty="0" smtClean="0"/>
-            </a:br>
-            <a:r>
-              <a:rPr lang="en-US" dirty="0" err="1" smtClean="0"/>
-              <a:t>github.com</a:t>
-            </a:r>
-            <a:r>
-              <a:rPr lang="en-US" dirty="0"/>
-              <a:t>/</a:t>
-            </a:r>
-            <a:r>
-              <a:rPr lang="en-US" dirty="0" err="1"/>
-              <a:t>omg</a:t>
-            </a:r>
-            <a:r>
-              <a:rPr lang="en-US" dirty="0"/>
-              <a:t>-threat-modeling/phase1</a:t>
-            </a:r>
-          </a:p>
-        </p:txBody>
-      </p:sp>
-    </p:spTree>
-    <p:extLst>
-      <p:ext uri="{BB962C8B-B14F-4D97-AF65-F5344CB8AC3E}">
-        <p14:creationId xmlns:p14="http://schemas.microsoft.com/office/powerpoint/2010/main" val="3526919438"/>
-      </p:ext>
-    </p:extLst>
-  </p:cSld>
-  <p:clrMapOvr>
-    <a:masterClrMapping/>
-  </p:clrMapOvr>
-</p:sld>
-</file>
-
-<file path=ppt/slides/slide14.xml><?xml version="1.0" encoding="utf-8"?>
-<p:sld xmlns:a="http://schemas.openxmlformats.org/drawingml/2006/main" xmlns:r="http://schemas.openxmlformats.org/officeDocument/2006/relationships" xmlns:p="http://schemas.openxmlformats.org/presentationml/2006/main">
-  <p:cSld>
-    <p:spTree>
-      <p:nvGrpSpPr>
-        <p:cNvPr id="1" name=""/>
-        <p:cNvGrpSpPr/>
-        <p:nvPr/>
-      </p:nvGrpSpPr>
-      <p:grpSpPr>
-        <a:xfrm>
-          <a:off x="0" y="0"/>
-          <a:ext cx="0" cy="0"/>
-          <a:chOff x="0" y="0"/>
-          <a:chExt cx="0" cy="0"/>
-        </a:xfrm>
-      </p:grpSpPr>
-      <p:sp>
-        <p:nvSpPr>
-          <p:cNvPr id="4" name="Title 3"/>
-          <p:cNvSpPr>
-            <a:spLocks noGrp="1"/>
-          </p:cNvSpPr>
-          <p:nvPr>
-            <p:ph type="title"/>
-          </p:nvPr>
-        </p:nvSpPr>
-        <p:spPr/>
-        <p:txBody>
-          <a:bodyPr/>
-          <a:lstStyle/>
-          <a:p>
-            <a:r>
-              <a:rPr lang="en-US" dirty="0" smtClean="0"/>
-              <a:t>Backup</a:t>
-            </a:r>
-            <a:endParaRPr lang="en-US" dirty="0"/>
-          </a:p>
-        </p:txBody>
-      </p:sp>
-      <p:sp>
-        <p:nvSpPr>
-          <p:cNvPr id="5" name="Text Placeholder 4"/>
-          <p:cNvSpPr>
-            <a:spLocks noGrp="1"/>
-          </p:cNvSpPr>
-          <p:nvPr>
-            <p:ph type="body" idx="1"/>
-          </p:nvPr>
-        </p:nvSpPr>
-        <p:spPr/>
-        <p:txBody>
-          <a:bodyPr/>
-          <a:lstStyle/>
-          <a:p>
-            <a:endParaRPr lang="en-US"/>
-          </a:p>
-        </p:txBody>
-      </p:sp>
-    </p:spTree>
-    <p:extLst>
-      <p:ext uri="{BB962C8B-B14F-4D97-AF65-F5344CB8AC3E}">
-        <p14:creationId xmlns:p14="http://schemas.microsoft.com/office/powerpoint/2010/main" val="519211838"/>
-      </p:ext>
-    </p:extLst>
-  </p:cSld>
-  <p:clrMapOvr>
-    <a:masterClrMapping/>
-  </p:clrMapOvr>
-</p:sld>
-</file>
-
-<file path=ppt/slides/slide15.xml><?xml version="1.0" encoding="utf-8"?>
-<p:sld xmlns:a="http://schemas.openxmlformats.org/drawingml/2006/main" xmlns:r="http://schemas.openxmlformats.org/officeDocument/2006/relationships" xmlns:p="http://schemas.openxmlformats.org/presentationml/2006/main">
-  <p:cSld>
-    <p:spTree>
-      <p:nvGrpSpPr>
-        <p:cNvPr id="1" name=""/>
-        <p:cNvGrpSpPr/>
-        <p:nvPr/>
-      </p:nvGrpSpPr>
-      <p:grpSpPr>
-        <a:xfrm>
-          <a:off x="0" y="0"/>
-          <a:ext cx="0" cy="0"/>
-          <a:chOff x="0" y="0"/>
-          <a:chExt cx="0" cy="0"/>
-        </a:xfrm>
-      </p:grpSpPr>
-      <p:sp>
-        <p:nvSpPr>
-          <p:cNvPr id="2" name="Title 1"/>
-          <p:cNvSpPr>
-            <a:spLocks noGrp="1"/>
-          </p:cNvSpPr>
-          <p:nvPr>
-            <p:ph type="title"/>
-          </p:nvPr>
-        </p:nvSpPr>
-        <p:spPr/>
-        <p:txBody>
-          <a:bodyPr/>
-          <a:lstStyle/>
-          <a:p>
-            <a:r>
-              <a:rPr lang="en-US" dirty="0" smtClean="0"/>
-              <a:t>Use Case: Large Company</a:t>
-            </a:r>
-            <a:endParaRPr lang="en-US" dirty="0"/>
-          </a:p>
-        </p:txBody>
-      </p:sp>
-      <p:sp>
-        <p:nvSpPr>
-          <p:cNvPr id="3" name="Content Placeholder 2"/>
-          <p:cNvSpPr>
-            <a:spLocks noGrp="1"/>
-          </p:cNvSpPr>
-          <p:nvPr>
-            <p:ph idx="1"/>
-          </p:nvPr>
-        </p:nvSpPr>
-        <p:spPr/>
-        <p:txBody>
-          <a:bodyPr>
-            <a:normAutofit fontScale="92500"/>
-          </a:bodyPr>
-          <a:lstStyle/>
-          <a:p>
-            <a:r>
-              <a:rPr lang="en-US" dirty="0" smtClean="0"/>
-              <a:t>Scenario 1a: External attack</a:t>
-            </a:r>
-          </a:p>
-          <a:p>
-            <a:pPr lvl="1"/>
-            <a:r>
-              <a:rPr lang="en-US" dirty="0" smtClean="0"/>
-              <a:t>TTPs: </a:t>
-            </a:r>
-            <a:r>
-              <a:rPr lang="en-US" dirty="0" err="1" smtClean="0"/>
-              <a:t>Spearphishing</a:t>
-            </a:r>
-            <a:r>
-              <a:rPr lang="en-US" dirty="0" smtClean="0"/>
-              <a:t>, stolen mobile devices, stolen hard tokens/credentials, office break-in, APT deployment, </a:t>
-            </a:r>
-            <a:r>
-              <a:rPr lang="en-US" dirty="0" err="1" smtClean="0"/>
-              <a:t>DDoS</a:t>
-            </a:r>
-            <a:r>
-              <a:rPr lang="en-US" dirty="0" smtClean="0"/>
-              <a:t> attacks</a:t>
-            </a:r>
-          </a:p>
-          <a:p>
-            <a:pPr lvl="1"/>
-            <a:r>
-              <a:rPr lang="en-US" dirty="0" smtClean="0"/>
-              <a:t>Goals: </a:t>
-            </a:r>
-          </a:p>
-          <a:p>
-            <a:pPr lvl="2"/>
-            <a:r>
-              <a:rPr lang="en-US" dirty="0" smtClean="0"/>
-              <a:t>Financial gain: identity theft, credit card fraud, stock market manipulation, extortion</a:t>
-            </a:r>
-          </a:p>
-          <a:p>
-            <a:pPr lvl="1"/>
-            <a:r>
-              <a:rPr lang="en-US" dirty="0" smtClean="0"/>
-              <a:t>Main target/concerns: systems</a:t>
-            </a:r>
-          </a:p>
-          <a:p>
-            <a:pPr lvl="1"/>
-            <a:r>
-              <a:rPr lang="en-US" dirty="0" smtClean="0"/>
-              <a:t>Systems involved: email/communications, end-user devices, physical locations, various security systems</a:t>
-            </a:r>
-          </a:p>
-          <a:p>
-            <a:pPr lvl="1"/>
-            <a:endParaRPr lang="en-US" dirty="0" smtClean="0"/>
-          </a:p>
-        </p:txBody>
-      </p:sp>
-    </p:spTree>
-    <p:extLst>
-      <p:ext uri="{BB962C8B-B14F-4D97-AF65-F5344CB8AC3E}">
-        <p14:creationId xmlns:p14="http://schemas.microsoft.com/office/powerpoint/2010/main" val="3741302118"/>
-      </p:ext>
-    </p:extLst>
-  </p:cSld>
-  <p:clrMapOvr>
-    <a:masterClrMapping/>
-  </p:clrMapOvr>
-</p:sld>
-</file>
-
-<file path=ppt/slides/slide16.xml><?xml version="1.0" encoding="utf-8"?>
-<p:sld xmlns:a="http://schemas.openxmlformats.org/drawingml/2006/main" xmlns:r="http://schemas.openxmlformats.org/officeDocument/2006/relationships" xmlns:p="http://schemas.openxmlformats.org/presentationml/2006/main">
-  <p:cSld>
-    <p:spTree>
-      <p:nvGrpSpPr>
-        <p:cNvPr id="1" name=""/>
-        <p:cNvGrpSpPr/>
-        <p:nvPr/>
-      </p:nvGrpSpPr>
-      <p:grpSpPr>
-        <a:xfrm>
-          <a:off x="0" y="0"/>
-          <a:ext cx="0" cy="0"/>
-          <a:chOff x="0" y="0"/>
-          <a:chExt cx="0" cy="0"/>
-        </a:xfrm>
-      </p:grpSpPr>
-      <p:sp>
-        <p:nvSpPr>
-          <p:cNvPr id="2" name="Title 1"/>
-          <p:cNvSpPr>
-            <a:spLocks noGrp="1"/>
-          </p:cNvSpPr>
-          <p:nvPr>
-            <p:ph type="title"/>
-          </p:nvPr>
-        </p:nvSpPr>
-        <p:spPr/>
-        <p:txBody>
-          <a:bodyPr/>
-          <a:lstStyle/>
-          <a:p>
-            <a:r>
-              <a:rPr lang="en-US" dirty="0" smtClean="0"/>
-              <a:t>Use Case: Large Company</a:t>
-            </a:r>
-            <a:endParaRPr lang="en-US" dirty="0"/>
-          </a:p>
-        </p:txBody>
-      </p:sp>
-      <p:sp>
-        <p:nvSpPr>
-          <p:cNvPr id="3" name="Content Placeholder 2"/>
-          <p:cNvSpPr>
-            <a:spLocks noGrp="1"/>
-          </p:cNvSpPr>
-          <p:nvPr>
-            <p:ph idx="1"/>
-          </p:nvPr>
-        </p:nvSpPr>
-        <p:spPr/>
-        <p:txBody>
-          <a:bodyPr>
-            <a:normAutofit fontScale="92500" lnSpcReduction="10000"/>
-          </a:bodyPr>
-          <a:lstStyle/>
-          <a:p>
-            <a:r>
-              <a:rPr lang="en-US" dirty="0" smtClean="0"/>
-              <a:t>Scenario 1b: External attack</a:t>
-            </a:r>
-          </a:p>
-          <a:p>
-            <a:pPr lvl="1"/>
-            <a:r>
-              <a:rPr lang="en-US" dirty="0" smtClean="0"/>
-              <a:t>TTPs: </a:t>
-            </a:r>
-            <a:r>
-              <a:rPr lang="en-US" dirty="0" err="1" smtClean="0"/>
-              <a:t>Spearphishing</a:t>
-            </a:r>
-            <a:r>
-              <a:rPr lang="en-US" dirty="0" smtClean="0"/>
-              <a:t>, stolen mobile devices, stolen hard tokens/credentials, office break-in, APT deployment, </a:t>
-            </a:r>
-            <a:r>
-              <a:rPr lang="en-US" dirty="0" err="1" smtClean="0"/>
-              <a:t>DDoS</a:t>
-            </a:r>
-            <a:r>
-              <a:rPr lang="en-US" dirty="0" smtClean="0"/>
-              <a:t> attacks</a:t>
-            </a:r>
-          </a:p>
-          <a:p>
-            <a:pPr lvl="1"/>
-            <a:r>
-              <a:rPr lang="en-US" dirty="0" smtClean="0"/>
-              <a:t>Goals: </a:t>
-            </a:r>
-          </a:p>
-          <a:p>
-            <a:pPr lvl="2"/>
-            <a:r>
-              <a:rPr lang="en-US" dirty="0" smtClean="0"/>
-              <a:t>Competitive advantage: stock market manipulation, reputation loss, poach on employee talent base, industrial espionage/intellectual property theft</a:t>
-            </a:r>
-          </a:p>
-          <a:p>
-            <a:pPr lvl="1"/>
-            <a:r>
-              <a:rPr lang="en-US" dirty="0" smtClean="0"/>
-              <a:t>Main target/concern: humans</a:t>
-            </a:r>
-          </a:p>
-          <a:p>
-            <a:pPr lvl="1"/>
-            <a:r>
-              <a:rPr lang="en-US" dirty="0" smtClean="0"/>
-              <a:t>Systems involved: email/communications, end-user devices, physical locations, various security systems</a:t>
-            </a:r>
-          </a:p>
-          <a:p>
-            <a:pPr lvl="1"/>
-            <a:endParaRPr lang="en-US" dirty="0" smtClean="0"/>
-          </a:p>
-        </p:txBody>
-      </p:sp>
-    </p:spTree>
-    <p:extLst>
-      <p:ext uri="{BB962C8B-B14F-4D97-AF65-F5344CB8AC3E}">
-        <p14:creationId xmlns:p14="http://schemas.microsoft.com/office/powerpoint/2010/main" val="3788072214"/>
-      </p:ext>
-    </p:extLst>
-  </p:cSld>
-  <p:clrMapOvr>
-    <a:masterClrMapping/>
-  </p:clrMapOvr>
-</p:sld>
-</file>
-
-<file path=ppt/slides/slide17.xml><?xml version="1.0" encoding="utf-8"?>
-<p:sld xmlns:a="http://schemas.openxmlformats.org/drawingml/2006/main" xmlns:r="http://schemas.openxmlformats.org/officeDocument/2006/relationships" xmlns:p="http://schemas.openxmlformats.org/presentationml/2006/main">
-  <p:cSld>
-    <p:spTree>
-      <p:nvGrpSpPr>
-        <p:cNvPr id="1" name=""/>
-        <p:cNvGrpSpPr/>
-        <p:nvPr/>
-      </p:nvGrpSpPr>
-      <p:grpSpPr>
-        <a:xfrm>
-          <a:off x="0" y="0"/>
-          <a:ext cx="0" cy="0"/>
-          <a:chOff x="0" y="0"/>
-          <a:chExt cx="0" cy="0"/>
-        </a:xfrm>
-      </p:grpSpPr>
-      <p:sp>
-        <p:nvSpPr>
-          <p:cNvPr id="2" name="Title 1"/>
-          <p:cNvSpPr>
-            <a:spLocks noGrp="1"/>
-          </p:cNvSpPr>
-          <p:nvPr>
-            <p:ph type="title"/>
-          </p:nvPr>
-        </p:nvSpPr>
-        <p:spPr/>
-        <p:txBody>
-          <a:bodyPr/>
-          <a:lstStyle/>
-          <a:p>
-            <a:r>
-              <a:rPr lang="en-US" dirty="0" smtClean="0"/>
-              <a:t>Use Case: Large Company</a:t>
-            </a:r>
-            <a:endParaRPr lang="en-US" dirty="0"/>
-          </a:p>
-        </p:txBody>
-      </p:sp>
-      <p:sp>
-        <p:nvSpPr>
-          <p:cNvPr id="3" name="Content Placeholder 2"/>
-          <p:cNvSpPr>
-            <a:spLocks noGrp="1"/>
-          </p:cNvSpPr>
-          <p:nvPr>
-            <p:ph idx="1"/>
-          </p:nvPr>
-        </p:nvSpPr>
-        <p:spPr/>
-        <p:txBody>
-          <a:bodyPr>
-            <a:normAutofit fontScale="92500" lnSpcReduction="10000"/>
-          </a:bodyPr>
-          <a:lstStyle/>
-          <a:p>
-            <a:r>
-              <a:rPr lang="en-US" dirty="0" smtClean="0"/>
-              <a:t>Scenario 2a: Insider threat</a:t>
-            </a:r>
-          </a:p>
-          <a:p>
-            <a:pPr lvl="1"/>
-            <a:r>
-              <a:rPr lang="en-US" dirty="0" smtClean="0"/>
-              <a:t>TTPs: Malicious activity (including disabling security systems, data exfiltration, data manipulation, backdoors/forged credentials, etc.), APT deployment, physical attack</a:t>
-            </a:r>
-          </a:p>
-          <a:p>
-            <a:pPr lvl="1"/>
-            <a:r>
-              <a:rPr lang="en-US" dirty="0" smtClean="0"/>
-              <a:t>Goals: </a:t>
-            </a:r>
-          </a:p>
-          <a:p>
-            <a:pPr lvl="2"/>
-            <a:r>
-              <a:rPr lang="en-US" dirty="0" smtClean="0"/>
-              <a:t>Financial gain: credit card fraud, identity theft, intellectual property theft, asset theft, industrial espionage, extortion</a:t>
-            </a:r>
-          </a:p>
-          <a:p>
-            <a:pPr lvl="1"/>
-            <a:r>
-              <a:rPr lang="en-US" dirty="0" smtClean="0"/>
-              <a:t>Main target/concerns: humans</a:t>
-            </a:r>
-          </a:p>
-          <a:p>
-            <a:pPr lvl="1"/>
-            <a:r>
-              <a:rPr lang="en-US" dirty="0" smtClean="0"/>
-              <a:t>Systems involved: servers and end-user devices, various security systems, physical security systems</a:t>
-            </a:r>
-            <a:endParaRPr lang="en-US" dirty="0"/>
-          </a:p>
-        </p:txBody>
-      </p:sp>
-    </p:spTree>
-    <p:extLst>
-      <p:ext uri="{BB962C8B-B14F-4D97-AF65-F5344CB8AC3E}">
-        <p14:creationId xmlns:p14="http://schemas.microsoft.com/office/powerpoint/2010/main" val="1688720882"/>
-      </p:ext>
-    </p:extLst>
-  </p:cSld>
-  <p:clrMapOvr>
-    <a:masterClrMapping/>
-  </p:clrMapOvr>
-</p:sld>
-</file>
-
 <file path=ppt/slides/slide18.xml><?xml version="1.0" encoding="utf-8"?>
 <p:sld xmlns:a="http://schemas.openxmlformats.org/drawingml/2006/main" xmlns:r="http://schemas.openxmlformats.org/officeDocument/2006/relationships" xmlns:p="http://schemas.openxmlformats.org/presentationml/2006/main">
   <p:cSld>
@@ -4471,7 +4297,7 @@
       </p:grpSpPr>
       <p:sp>
         <p:nvSpPr>
-          <p:cNvPr id="2" name="Title 1"/>
+          <p:cNvPr id="3" name="Title 2"/>
           <p:cNvSpPr>
             <a:spLocks noGrp="1"/>
           </p:cNvSpPr>
@@ -4486,7 +4312,7 @@
           <a:p>
             <a:r>
               <a:rPr lang="en-US" dirty="0" smtClean="0"/>
-              <a:t>Use Case: Large Company</a:t>
+              <a:t>Call to Action</a:t>
             </a:r>
             <a:endParaRPr lang="en-US" dirty="0"/>
           </a:p>
@@ -4494,7 +4320,7 @@
       </p:sp>
       <p:sp>
         <p:nvSpPr>
-          <p:cNvPr id="3" name="Content Placeholder 2"/>
+          <p:cNvPr id="4" name="Content Placeholder 3"/>
           <p:cNvSpPr>
             <a:spLocks noGrp="1"/>
           </p:cNvSpPr>
@@ -4504,58 +4330,156 @@
         </p:nvSpPr>
         <p:spPr/>
         <p:txBody>
-          <a:bodyPr>
-            <a:normAutofit fontScale="92500" lnSpcReduction="10000"/>
-          </a:bodyPr>
+          <a:bodyPr/>
           <a:lstStyle/>
           <a:p>
             <a:r>
               <a:rPr lang="en-US" dirty="0" smtClean="0"/>
-              <a:t>Scenario 2b: Insider threat</a:t>
-            </a:r>
-          </a:p>
-          <a:p>
-            <a:pPr lvl="1"/>
-            <a:r>
-              <a:rPr lang="en-US" dirty="0" smtClean="0"/>
-              <a:t>TTPs: Malicious activity (including disabling security systems, data exfiltration, data manipulation, backdoors/forged credentials, etc.), APT deployment, physical attack</a:t>
-            </a:r>
-          </a:p>
-          <a:p>
-            <a:pPr lvl="1"/>
-            <a:r>
-              <a:rPr lang="en-US" dirty="0" smtClean="0"/>
-              <a:t>Goals: </a:t>
-            </a:r>
-          </a:p>
-          <a:p>
-            <a:pPr lvl="2"/>
-            <a:r>
-              <a:rPr lang="en-US" dirty="0" smtClean="0"/>
-              <a:t>Retaliation: attack on service availability, identity theft, reputation loss, physical damage and personal harm</a:t>
-            </a:r>
-          </a:p>
-          <a:p>
-            <a:pPr lvl="1"/>
-            <a:r>
-              <a:rPr lang="en-US" dirty="0" smtClean="0"/>
-              <a:t>Main target/concerns: humans and organizations</a:t>
-            </a:r>
-          </a:p>
-          <a:p>
-            <a:pPr lvl="1"/>
-            <a:r>
-              <a:rPr lang="en-US" dirty="0" smtClean="0"/>
-              <a:t>Systems involved: servers and end-user devices, various security systems, physical security systems</a:t>
+              <a:t>Email list</a:t>
+            </a:r>
+            <a:br>
+              <a:rPr lang="en-US" dirty="0" smtClean="0"/>
+            </a:br>
+            <a:r>
+              <a:rPr lang="en-US" dirty="0" smtClean="0">
+                <a:hlinkClick r:id="rId2"/>
+              </a:rPr>
+              <a:t>threat-modeling@</a:t>
+            </a:r>
+            <a:r>
+              <a:rPr lang="en-US" dirty="0" smtClean="0">
+                <a:hlinkClick r:id="rId2"/>
+              </a:rPr>
+              <a:t>omg.org</a:t>
+            </a:r>
+            <a:r>
+              <a:rPr lang="en-US" dirty="0"/>
+              <a:t/>
+            </a:r>
+            <a:br>
+              <a:rPr lang="en-US" dirty="0"/>
+            </a:br>
+            <a:r>
+              <a:rPr lang="en-US" dirty="0" smtClean="0"/>
+              <a:t>(</a:t>
+            </a:r>
+            <a:r>
+              <a:rPr lang="en-US" dirty="0" smtClean="0"/>
+              <a:t>Subscription via </a:t>
+            </a:r>
+            <a:r>
+              <a:rPr lang="en-US" dirty="0" smtClean="0">
+                <a:hlinkClick r:id="rId3"/>
+              </a:rPr>
+              <a:t>request@omg.org</a:t>
+            </a:r>
+            <a:r>
+              <a:rPr lang="en-US" dirty="0" smtClean="0"/>
+              <a:t>)</a:t>
+            </a:r>
+          </a:p>
+          <a:p>
+            <a:r>
+              <a:rPr lang="en-US" dirty="0" err="1" smtClean="0"/>
+              <a:t>GitHub</a:t>
+            </a:r>
+            <a:r>
+              <a:rPr lang="en-US" dirty="0" smtClean="0"/>
+              <a:t> </a:t>
+            </a:r>
+            <a:r>
+              <a:rPr lang="en-US" dirty="0" smtClean="0"/>
+              <a:t>Pages</a:t>
+            </a:r>
+            <a:br>
+              <a:rPr lang="en-US" dirty="0" smtClean="0"/>
+            </a:br>
+            <a:r>
+              <a:rPr lang="en-US" dirty="0" smtClean="0">
+                <a:hlinkClick r:id="rId4"/>
+              </a:rPr>
+              <a:t>https://github.com</a:t>
+            </a:r>
+            <a:r>
+              <a:rPr lang="en-US" dirty="0">
+                <a:hlinkClick r:id="rId4"/>
+              </a:rPr>
+              <a:t>/omg-threat-modeling/</a:t>
+            </a:r>
+            <a:r>
+              <a:rPr lang="en-US" dirty="0" smtClean="0">
+                <a:hlinkClick r:id="rId4"/>
+              </a:rPr>
+              <a:t>phase1/</a:t>
+            </a:r>
+            <a:r>
+              <a:rPr lang="en-US" dirty="0" smtClean="0"/>
+              <a:t> </a:t>
+            </a:r>
+          </a:p>
+          <a:p>
+            <a:r>
+              <a:rPr lang="en-US" dirty="0" smtClean="0"/>
+              <a:t>Weekly </a:t>
+            </a:r>
+            <a:r>
+              <a:rPr lang="en-US" dirty="0"/>
+              <a:t>calls: Mondays, 1pm </a:t>
+            </a:r>
+            <a:r>
+              <a:rPr lang="en-US" dirty="0" smtClean="0"/>
+              <a:t>ET</a:t>
             </a:r>
             <a:endParaRPr lang="en-US" dirty="0"/>
+          </a:p>
+        </p:txBody>
+      </p:sp>
+      <p:sp>
+        <p:nvSpPr>
+          <p:cNvPr id="2" name="Rounded Rectangle 1"/>
+          <p:cNvSpPr/>
+          <p:nvPr/>
+        </p:nvSpPr>
+        <p:spPr>
+          <a:xfrm>
+            <a:off x="457200" y="5678163"/>
+            <a:ext cx="8229600" cy="747126"/>
+          </a:xfrm>
+          <a:prstGeom prst="roundRect">
+            <a:avLst/>
+          </a:prstGeom>
+        </p:spPr>
+        <p:style>
+          <a:lnRef idx="1">
+            <a:schemeClr val="accent1"/>
+          </a:lnRef>
+          <a:fillRef idx="3">
+            <a:schemeClr val="accent1"/>
+          </a:fillRef>
+          <a:effectRef idx="2">
+            <a:schemeClr val="accent1"/>
+          </a:effectRef>
+          <a:fontRef idx="minor">
+            <a:schemeClr val="lt1"/>
+          </a:fontRef>
+        </p:style>
+        <p:txBody>
+          <a:bodyPr rtlCol="0" anchor="ctr"/>
+          <a:lstStyle/>
+          <a:p>
+            <a:pPr algn="ctr"/>
+            <a:r>
+              <a:rPr lang="en-US" sz="3200" b="1" i="1" dirty="0" smtClean="0"/>
+              <a:t>Join us!</a:t>
+            </a:r>
+            <a:endParaRPr lang="en-US" sz="3200" b="1" i="1" dirty="0"/>
           </a:p>
         </p:txBody>
       </p:sp>
     </p:spTree>
     <p:extLst>
       <p:ext uri="{BB962C8B-B14F-4D97-AF65-F5344CB8AC3E}">
-        <p14:creationId xmlns:p14="http://schemas.microsoft.com/office/powerpoint/2010/main" val="3134532630"/>
+        <p14:creationId xmlns:p14="http://schemas.microsoft.com/office/powerpoint/2010/main" val="3526919438"/>
       </p:ext>
     </p:extLst>
   </p:cSld>
@@ -4584,7 +4508,7 @@
       </p:grpSpPr>
       <p:sp>
         <p:nvSpPr>
-          <p:cNvPr id="2" name="Title 1"/>
+          <p:cNvPr id="4" name="Title 3"/>
           <p:cNvSpPr>
             <a:spLocks noGrp="1"/>
           </p:cNvSpPr>
@@ -4599,7 +4523,7 @@
           <a:p>
             <a:r>
               <a:rPr lang="en-US" dirty="0" smtClean="0"/>
-              <a:t>Use Case: Large Company</a:t>
+              <a:t>Backup</a:t>
             </a:r>
             <a:endParaRPr lang="en-US" dirty="0"/>
           </a:p>
@@ -4607,68 +4531,27 @@
       </p:sp>
       <p:sp>
         <p:nvSpPr>
-          <p:cNvPr id="3" name="Content Placeholder 2"/>
+          <p:cNvPr id="5" name="Text Placeholder 4"/>
           <p:cNvSpPr>
             <a:spLocks noGrp="1"/>
           </p:cNvSpPr>
           <p:nvPr>
-            <p:ph idx="1"/>
+            <p:ph type="body" idx="1"/>
           </p:nvPr>
         </p:nvSpPr>
         <p:spPr/>
         <p:txBody>
-          <a:bodyPr>
-            <a:normAutofit fontScale="92500" lnSpcReduction="10000"/>
-          </a:bodyPr>
+          <a:bodyPr/>
           <a:lstStyle/>
           <a:p>
-            <a:r>
-              <a:rPr lang="en-US" dirty="0" smtClean="0"/>
-              <a:t>Scenario 2c: Insider threat</a:t>
-            </a:r>
-          </a:p>
-          <a:p>
-            <a:pPr lvl="1"/>
-            <a:r>
-              <a:rPr lang="en-US" dirty="0" smtClean="0"/>
-              <a:t>TTPs: Malicious activity (including disabling security systems, data exfiltration, data manipulation, backdoors/forged credentials, etc.), APT deployment, physical attack</a:t>
-            </a:r>
-          </a:p>
-          <a:p>
-            <a:pPr lvl="1"/>
-            <a:r>
-              <a:rPr lang="en-US" dirty="0" smtClean="0"/>
-              <a:t>Goals: </a:t>
-            </a:r>
-          </a:p>
-          <a:p>
-            <a:pPr lvl="2"/>
-            <a:r>
-              <a:rPr lang="en-US" dirty="0" smtClean="0"/>
-              <a:t>Espionage: intellectual property theft, industrial espionage</a:t>
-            </a:r>
-          </a:p>
-          <a:p>
-            <a:pPr lvl="1"/>
-            <a:r>
-              <a:rPr lang="en-US" dirty="0" smtClean="0"/>
-              <a:t>Main target/concern: humans and organizations</a:t>
-            </a:r>
-          </a:p>
-          <a:p>
-            <a:pPr lvl="1"/>
-            <a:r>
-              <a:rPr lang="en-US" dirty="0" smtClean="0"/>
-              <a:t>Systems involved: servers and end-user devices, paper files, various security systems, physical security systems</a:t>
-            </a:r>
-            <a:endParaRPr lang="en-US" dirty="0"/>
+            <a:endParaRPr lang="en-US"/>
           </a:p>
         </p:txBody>
       </p:sp>
     </p:spTree>
     <p:extLst>
       <p:ext uri="{BB962C8B-B14F-4D97-AF65-F5344CB8AC3E}">
-        <p14:creationId xmlns:p14="http://schemas.microsoft.com/office/powerpoint/2010/main" val="2843220369"/>
+        <p14:creationId xmlns:p14="http://schemas.microsoft.com/office/powerpoint/2010/main" val="519211838"/>
       </p:ext>
     </p:extLst>
   </p:cSld>
@@ -4731,7 +4614,7 @@
         <p:spPr/>
         <p:txBody>
           <a:bodyPr>
-            <a:normAutofit fontScale="70000" lnSpcReduction="20000"/>
+            <a:normAutofit fontScale="62500" lnSpcReduction="20000"/>
           </a:bodyPr>
           <a:lstStyle/>
           <a:p>
@@ -4762,8 +4645,13 @@
             </a:r>
             <a:r>
               <a:rPr lang="en-US" dirty="0" smtClean="0"/>
-              <a:t>to non-cyber domains</a:t>
-            </a:r>
+              <a:t>to non-cyber </a:t>
+            </a:r>
+            <a:r>
+              <a:rPr lang="en-US" dirty="0" smtClean="0"/>
+              <a:t>domains</a:t>
+            </a:r>
+            <a:endParaRPr lang="en-US" dirty="0" smtClean="0"/>
           </a:p>
           <a:p>
             <a:r>
@@ -4820,6 +4708,13 @@
             <a:r>
               <a:rPr lang="en-US" dirty="0" smtClean="0"/>
               <a:t>Explore additional use cases (including modeling and predictive analysis)</a:t>
+            </a:r>
+          </a:p>
+          <a:p>
+            <a:pPr lvl="1"/>
+            <a:r>
+              <a:rPr lang="en-US" dirty="0" smtClean="0"/>
+              <a:t>Explore integration with Risk Meta Model </a:t>
             </a:r>
             <a:endParaRPr lang="en-US" dirty="0"/>
           </a:p>
@@ -4878,6 +4773,609 @@
           <a:lstStyle/>
           <a:p>
             <a:r>
+              <a:rPr lang="en-US" dirty="0" smtClean="0"/>
+              <a:t>Use Case: Large Company</a:t>
+            </a:r>
+            <a:endParaRPr lang="en-US" dirty="0"/>
+          </a:p>
+        </p:txBody>
+      </p:sp>
+      <p:sp>
+        <p:nvSpPr>
+          <p:cNvPr id="3" name="Content Placeholder 2"/>
+          <p:cNvSpPr>
+            <a:spLocks noGrp="1"/>
+          </p:cNvSpPr>
+          <p:nvPr>
+            <p:ph idx="1"/>
+          </p:nvPr>
+        </p:nvSpPr>
+        <p:spPr/>
+        <p:txBody>
+          <a:bodyPr>
+            <a:normAutofit fontScale="92500"/>
+          </a:bodyPr>
+          <a:lstStyle/>
+          <a:p>
+            <a:r>
+              <a:rPr lang="en-US" dirty="0" smtClean="0"/>
+              <a:t>Scenario 1a: External attack</a:t>
+            </a:r>
+          </a:p>
+          <a:p>
+            <a:pPr lvl="1"/>
+            <a:r>
+              <a:rPr lang="en-US" dirty="0" smtClean="0"/>
+              <a:t>TTPs: </a:t>
+            </a:r>
+            <a:r>
+              <a:rPr lang="en-US" dirty="0" err="1" smtClean="0"/>
+              <a:t>Spearphishing</a:t>
+            </a:r>
+            <a:r>
+              <a:rPr lang="en-US" dirty="0" smtClean="0"/>
+              <a:t>, stolen mobile devices, stolen hard tokens/credentials, office break-in, APT deployment, </a:t>
+            </a:r>
+            <a:r>
+              <a:rPr lang="en-US" dirty="0" err="1" smtClean="0"/>
+              <a:t>DDoS</a:t>
+            </a:r>
+            <a:r>
+              <a:rPr lang="en-US" dirty="0" smtClean="0"/>
+              <a:t> attacks</a:t>
+            </a:r>
+          </a:p>
+          <a:p>
+            <a:pPr lvl="1"/>
+            <a:r>
+              <a:rPr lang="en-US" dirty="0" smtClean="0"/>
+              <a:t>Goals: </a:t>
+            </a:r>
+          </a:p>
+          <a:p>
+            <a:pPr lvl="2"/>
+            <a:r>
+              <a:rPr lang="en-US" dirty="0" smtClean="0"/>
+              <a:t>Financial gain: identity theft, credit card fraud, stock market manipulation, extortion</a:t>
+            </a:r>
+          </a:p>
+          <a:p>
+            <a:pPr lvl="1"/>
+            <a:r>
+              <a:rPr lang="en-US" dirty="0" smtClean="0"/>
+              <a:t>Main target/concerns: systems</a:t>
+            </a:r>
+          </a:p>
+          <a:p>
+            <a:pPr lvl="1"/>
+            <a:r>
+              <a:rPr lang="en-US" dirty="0" smtClean="0"/>
+              <a:t>Systems involved: email/communications, end-user devices, physical locations, various security systems</a:t>
+            </a:r>
+          </a:p>
+          <a:p>
+            <a:pPr lvl="1"/>
+            <a:endParaRPr lang="en-US" dirty="0" smtClean="0"/>
+          </a:p>
+        </p:txBody>
+      </p:sp>
+    </p:spTree>
+    <p:extLst>
+      <p:ext uri="{BB962C8B-B14F-4D97-AF65-F5344CB8AC3E}">
+        <p14:creationId xmlns:p14="http://schemas.microsoft.com/office/powerpoint/2010/main" val="3741302118"/>
+      </p:ext>
+    </p:extLst>
+  </p:cSld>
+  <p:clrMapOvr>
+    <a:masterClrMapping/>
+  </p:clrMapOvr>
+</p:sld>
+</file>
+
+<file path=ppt/slides/slide21.xml><?xml version="1.0" encoding="utf-8"?>
+<p:sld xmlns:a="http://schemas.openxmlformats.org/drawingml/2006/main" xmlns:r="http://schemas.openxmlformats.org/officeDocument/2006/relationships" xmlns:p="http://schemas.openxmlformats.org/presentationml/2006/main">
+  <p:cSld>
+    <p:spTree>
+      <p:nvGrpSpPr>
+        <p:cNvPr id="1" name=""/>
+        <p:cNvGrpSpPr/>
+        <p:nvPr/>
+      </p:nvGrpSpPr>
+      <p:grpSpPr>
+        <a:xfrm>
+          <a:off x="0" y="0"/>
+          <a:ext cx="0" cy="0"/>
+          <a:chOff x="0" y="0"/>
+          <a:chExt cx="0" cy="0"/>
+        </a:xfrm>
+      </p:grpSpPr>
+      <p:sp>
+        <p:nvSpPr>
+          <p:cNvPr id="2" name="Title 1"/>
+          <p:cNvSpPr>
+            <a:spLocks noGrp="1"/>
+          </p:cNvSpPr>
+          <p:nvPr>
+            <p:ph type="title"/>
+          </p:nvPr>
+        </p:nvSpPr>
+        <p:spPr/>
+        <p:txBody>
+          <a:bodyPr/>
+          <a:lstStyle/>
+          <a:p>
+            <a:r>
+              <a:rPr lang="en-US" dirty="0" smtClean="0"/>
+              <a:t>Use Case: Large Company</a:t>
+            </a:r>
+            <a:endParaRPr lang="en-US" dirty="0"/>
+          </a:p>
+        </p:txBody>
+      </p:sp>
+      <p:sp>
+        <p:nvSpPr>
+          <p:cNvPr id="3" name="Content Placeholder 2"/>
+          <p:cNvSpPr>
+            <a:spLocks noGrp="1"/>
+          </p:cNvSpPr>
+          <p:nvPr>
+            <p:ph idx="1"/>
+          </p:nvPr>
+        </p:nvSpPr>
+        <p:spPr/>
+        <p:txBody>
+          <a:bodyPr>
+            <a:normAutofit fontScale="92500" lnSpcReduction="10000"/>
+          </a:bodyPr>
+          <a:lstStyle/>
+          <a:p>
+            <a:r>
+              <a:rPr lang="en-US" dirty="0" smtClean="0"/>
+              <a:t>Scenario 1b: External attack</a:t>
+            </a:r>
+          </a:p>
+          <a:p>
+            <a:pPr lvl="1"/>
+            <a:r>
+              <a:rPr lang="en-US" dirty="0" smtClean="0"/>
+              <a:t>TTPs: </a:t>
+            </a:r>
+            <a:r>
+              <a:rPr lang="en-US" dirty="0" err="1" smtClean="0"/>
+              <a:t>Spearphishing</a:t>
+            </a:r>
+            <a:r>
+              <a:rPr lang="en-US" dirty="0" smtClean="0"/>
+              <a:t>, stolen mobile devices, stolen hard tokens/credentials, office break-in, APT deployment, </a:t>
+            </a:r>
+            <a:r>
+              <a:rPr lang="en-US" dirty="0" err="1" smtClean="0"/>
+              <a:t>DDoS</a:t>
+            </a:r>
+            <a:r>
+              <a:rPr lang="en-US" dirty="0" smtClean="0"/>
+              <a:t> attacks</a:t>
+            </a:r>
+          </a:p>
+          <a:p>
+            <a:pPr lvl="1"/>
+            <a:r>
+              <a:rPr lang="en-US" dirty="0" smtClean="0"/>
+              <a:t>Goals: </a:t>
+            </a:r>
+          </a:p>
+          <a:p>
+            <a:pPr lvl="2"/>
+            <a:r>
+              <a:rPr lang="en-US" dirty="0" smtClean="0"/>
+              <a:t>Competitive advantage: stock market manipulation, reputation loss, poach on employee talent base, industrial espionage/intellectual property theft</a:t>
+            </a:r>
+          </a:p>
+          <a:p>
+            <a:pPr lvl="1"/>
+            <a:r>
+              <a:rPr lang="en-US" dirty="0" smtClean="0"/>
+              <a:t>Main target/concern: humans</a:t>
+            </a:r>
+          </a:p>
+          <a:p>
+            <a:pPr lvl="1"/>
+            <a:r>
+              <a:rPr lang="en-US" dirty="0" smtClean="0"/>
+              <a:t>Systems involved: email/communications, end-user devices, physical locations, various security systems</a:t>
+            </a:r>
+          </a:p>
+          <a:p>
+            <a:pPr lvl="1"/>
+            <a:endParaRPr lang="en-US" dirty="0" smtClean="0"/>
+          </a:p>
+        </p:txBody>
+      </p:sp>
+    </p:spTree>
+    <p:extLst>
+      <p:ext uri="{BB962C8B-B14F-4D97-AF65-F5344CB8AC3E}">
+        <p14:creationId xmlns:p14="http://schemas.microsoft.com/office/powerpoint/2010/main" val="3788072214"/>
+      </p:ext>
+    </p:extLst>
+  </p:cSld>
+  <p:clrMapOvr>
+    <a:masterClrMapping/>
+  </p:clrMapOvr>
+</p:sld>
+</file>
+
+<file path=ppt/slides/slide22.xml><?xml version="1.0" encoding="utf-8"?>
+<p:sld xmlns:a="http://schemas.openxmlformats.org/drawingml/2006/main" xmlns:r="http://schemas.openxmlformats.org/officeDocument/2006/relationships" xmlns:p="http://schemas.openxmlformats.org/presentationml/2006/main">
+  <p:cSld>
+    <p:spTree>
+      <p:nvGrpSpPr>
+        <p:cNvPr id="1" name=""/>
+        <p:cNvGrpSpPr/>
+        <p:nvPr/>
+      </p:nvGrpSpPr>
+      <p:grpSpPr>
+        <a:xfrm>
+          <a:off x="0" y="0"/>
+          <a:ext cx="0" cy="0"/>
+          <a:chOff x="0" y="0"/>
+          <a:chExt cx="0" cy="0"/>
+        </a:xfrm>
+      </p:grpSpPr>
+      <p:sp>
+        <p:nvSpPr>
+          <p:cNvPr id="2" name="Title 1"/>
+          <p:cNvSpPr>
+            <a:spLocks noGrp="1"/>
+          </p:cNvSpPr>
+          <p:nvPr>
+            <p:ph type="title"/>
+          </p:nvPr>
+        </p:nvSpPr>
+        <p:spPr/>
+        <p:txBody>
+          <a:bodyPr/>
+          <a:lstStyle/>
+          <a:p>
+            <a:r>
+              <a:rPr lang="en-US" dirty="0" smtClean="0"/>
+              <a:t>Use Case: Large Company</a:t>
+            </a:r>
+            <a:endParaRPr lang="en-US" dirty="0"/>
+          </a:p>
+        </p:txBody>
+      </p:sp>
+      <p:sp>
+        <p:nvSpPr>
+          <p:cNvPr id="3" name="Content Placeholder 2"/>
+          <p:cNvSpPr>
+            <a:spLocks noGrp="1"/>
+          </p:cNvSpPr>
+          <p:nvPr>
+            <p:ph idx="1"/>
+          </p:nvPr>
+        </p:nvSpPr>
+        <p:spPr/>
+        <p:txBody>
+          <a:bodyPr>
+            <a:normAutofit fontScale="92500" lnSpcReduction="10000"/>
+          </a:bodyPr>
+          <a:lstStyle/>
+          <a:p>
+            <a:r>
+              <a:rPr lang="en-US" dirty="0" smtClean="0"/>
+              <a:t>Scenario 2a: Insider threat</a:t>
+            </a:r>
+          </a:p>
+          <a:p>
+            <a:pPr lvl="1"/>
+            <a:r>
+              <a:rPr lang="en-US" dirty="0" smtClean="0"/>
+              <a:t>TTPs: Malicious activity (including disabling security systems, data exfiltration, data manipulation, backdoors/forged credentials, etc.), APT deployment, physical attack</a:t>
+            </a:r>
+          </a:p>
+          <a:p>
+            <a:pPr lvl="1"/>
+            <a:r>
+              <a:rPr lang="en-US" dirty="0" smtClean="0"/>
+              <a:t>Goals: </a:t>
+            </a:r>
+          </a:p>
+          <a:p>
+            <a:pPr lvl="2"/>
+            <a:r>
+              <a:rPr lang="en-US" dirty="0" smtClean="0"/>
+              <a:t>Financial gain: credit card fraud, identity theft, intellectual property theft, asset theft, industrial espionage, extortion</a:t>
+            </a:r>
+          </a:p>
+          <a:p>
+            <a:pPr lvl="1"/>
+            <a:r>
+              <a:rPr lang="en-US" dirty="0" smtClean="0"/>
+              <a:t>Main target/concerns: humans</a:t>
+            </a:r>
+          </a:p>
+          <a:p>
+            <a:pPr lvl="1"/>
+            <a:r>
+              <a:rPr lang="en-US" dirty="0" smtClean="0"/>
+              <a:t>Systems involved: servers and end-user devices, various security systems, physical security systems</a:t>
+            </a:r>
+            <a:endParaRPr lang="en-US" dirty="0"/>
+          </a:p>
+        </p:txBody>
+      </p:sp>
+    </p:spTree>
+    <p:extLst>
+      <p:ext uri="{BB962C8B-B14F-4D97-AF65-F5344CB8AC3E}">
+        <p14:creationId xmlns:p14="http://schemas.microsoft.com/office/powerpoint/2010/main" val="1688720882"/>
+      </p:ext>
+    </p:extLst>
+  </p:cSld>
+  <p:clrMapOvr>
+    <a:masterClrMapping/>
+  </p:clrMapOvr>
+</p:sld>
+</file>
+
+<file path=ppt/slides/slide23.xml><?xml version="1.0" encoding="utf-8"?>
+<p:sld xmlns:a="http://schemas.openxmlformats.org/drawingml/2006/main" xmlns:r="http://schemas.openxmlformats.org/officeDocument/2006/relationships" xmlns:p="http://schemas.openxmlformats.org/presentationml/2006/main">
+  <p:cSld>
+    <p:spTree>
+      <p:nvGrpSpPr>
+        <p:cNvPr id="1" name=""/>
+        <p:cNvGrpSpPr/>
+        <p:nvPr/>
+      </p:nvGrpSpPr>
+      <p:grpSpPr>
+        <a:xfrm>
+          <a:off x="0" y="0"/>
+          <a:ext cx="0" cy="0"/>
+          <a:chOff x="0" y="0"/>
+          <a:chExt cx="0" cy="0"/>
+        </a:xfrm>
+      </p:grpSpPr>
+      <p:sp>
+        <p:nvSpPr>
+          <p:cNvPr id="2" name="Title 1"/>
+          <p:cNvSpPr>
+            <a:spLocks noGrp="1"/>
+          </p:cNvSpPr>
+          <p:nvPr>
+            <p:ph type="title"/>
+          </p:nvPr>
+        </p:nvSpPr>
+        <p:spPr/>
+        <p:txBody>
+          <a:bodyPr/>
+          <a:lstStyle/>
+          <a:p>
+            <a:r>
+              <a:rPr lang="en-US" dirty="0" smtClean="0"/>
+              <a:t>Use Case: Large Company</a:t>
+            </a:r>
+            <a:endParaRPr lang="en-US" dirty="0"/>
+          </a:p>
+        </p:txBody>
+      </p:sp>
+      <p:sp>
+        <p:nvSpPr>
+          <p:cNvPr id="3" name="Content Placeholder 2"/>
+          <p:cNvSpPr>
+            <a:spLocks noGrp="1"/>
+          </p:cNvSpPr>
+          <p:nvPr>
+            <p:ph idx="1"/>
+          </p:nvPr>
+        </p:nvSpPr>
+        <p:spPr/>
+        <p:txBody>
+          <a:bodyPr>
+            <a:normAutofit fontScale="92500" lnSpcReduction="10000"/>
+          </a:bodyPr>
+          <a:lstStyle/>
+          <a:p>
+            <a:r>
+              <a:rPr lang="en-US" dirty="0" smtClean="0"/>
+              <a:t>Scenario 2b: Insider threat</a:t>
+            </a:r>
+          </a:p>
+          <a:p>
+            <a:pPr lvl="1"/>
+            <a:r>
+              <a:rPr lang="en-US" dirty="0" smtClean="0"/>
+              <a:t>TTPs: Malicious activity (including disabling security systems, data exfiltration, data manipulation, backdoors/forged credentials, etc.), APT deployment, physical attack</a:t>
+            </a:r>
+          </a:p>
+          <a:p>
+            <a:pPr lvl="1"/>
+            <a:r>
+              <a:rPr lang="en-US" dirty="0" smtClean="0"/>
+              <a:t>Goals: </a:t>
+            </a:r>
+          </a:p>
+          <a:p>
+            <a:pPr lvl="2"/>
+            <a:r>
+              <a:rPr lang="en-US" dirty="0" smtClean="0"/>
+              <a:t>Retaliation: attack on service availability, identity theft, reputation loss, physical damage and personal harm</a:t>
+            </a:r>
+          </a:p>
+          <a:p>
+            <a:pPr lvl="1"/>
+            <a:r>
+              <a:rPr lang="en-US" dirty="0" smtClean="0"/>
+              <a:t>Main target/concerns: humans and organizations</a:t>
+            </a:r>
+          </a:p>
+          <a:p>
+            <a:pPr lvl="1"/>
+            <a:r>
+              <a:rPr lang="en-US" dirty="0" smtClean="0"/>
+              <a:t>Systems involved: servers and end-user devices, various security systems, physical security systems</a:t>
+            </a:r>
+            <a:endParaRPr lang="en-US" dirty="0"/>
+          </a:p>
+        </p:txBody>
+      </p:sp>
+    </p:spTree>
+    <p:extLst>
+      <p:ext uri="{BB962C8B-B14F-4D97-AF65-F5344CB8AC3E}">
+        <p14:creationId xmlns:p14="http://schemas.microsoft.com/office/powerpoint/2010/main" val="3134532630"/>
+      </p:ext>
+    </p:extLst>
+  </p:cSld>
+  <p:clrMapOvr>
+    <a:masterClrMapping/>
+  </p:clrMapOvr>
+</p:sld>
+</file>
+
+<file path=ppt/slides/slide24.xml><?xml version="1.0" encoding="utf-8"?>
+<p:sld xmlns:a="http://schemas.openxmlformats.org/drawingml/2006/main" xmlns:r="http://schemas.openxmlformats.org/officeDocument/2006/relationships" xmlns:p="http://schemas.openxmlformats.org/presentationml/2006/main">
+  <p:cSld>
+    <p:spTree>
+      <p:nvGrpSpPr>
+        <p:cNvPr id="1" name=""/>
+        <p:cNvGrpSpPr/>
+        <p:nvPr/>
+      </p:nvGrpSpPr>
+      <p:grpSpPr>
+        <a:xfrm>
+          <a:off x="0" y="0"/>
+          <a:ext cx="0" cy="0"/>
+          <a:chOff x="0" y="0"/>
+          <a:chExt cx="0" cy="0"/>
+        </a:xfrm>
+      </p:grpSpPr>
+      <p:sp>
+        <p:nvSpPr>
+          <p:cNvPr id="2" name="Title 1"/>
+          <p:cNvSpPr>
+            <a:spLocks noGrp="1"/>
+          </p:cNvSpPr>
+          <p:nvPr>
+            <p:ph type="title"/>
+          </p:nvPr>
+        </p:nvSpPr>
+        <p:spPr/>
+        <p:txBody>
+          <a:bodyPr/>
+          <a:lstStyle/>
+          <a:p>
+            <a:r>
+              <a:rPr lang="en-US" dirty="0" smtClean="0"/>
+              <a:t>Use Case: Large Company</a:t>
+            </a:r>
+            <a:endParaRPr lang="en-US" dirty="0"/>
+          </a:p>
+        </p:txBody>
+      </p:sp>
+      <p:sp>
+        <p:nvSpPr>
+          <p:cNvPr id="3" name="Content Placeholder 2"/>
+          <p:cNvSpPr>
+            <a:spLocks noGrp="1"/>
+          </p:cNvSpPr>
+          <p:nvPr>
+            <p:ph idx="1"/>
+          </p:nvPr>
+        </p:nvSpPr>
+        <p:spPr/>
+        <p:txBody>
+          <a:bodyPr>
+            <a:normAutofit fontScale="92500" lnSpcReduction="10000"/>
+          </a:bodyPr>
+          <a:lstStyle/>
+          <a:p>
+            <a:r>
+              <a:rPr lang="en-US" dirty="0" smtClean="0"/>
+              <a:t>Scenario 2c: Insider threat</a:t>
+            </a:r>
+          </a:p>
+          <a:p>
+            <a:pPr lvl="1"/>
+            <a:r>
+              <a:rPr lang="en-US" dirty="0" smtClean="0"/>
+              <a:t>TTPs: Malicious activity (including disabling security systems, data exfiltration, data manipulation, backdoors/forged credentials, etc.), APT deployment, physical attack</a:t>
+            </a:r>
+          </a:p>
+          <a:p>
+            <a:pPr lvl="1"/>
+            <a:r>
+              <a:rPr lang="en-US" dirty="0" smtClean="0"/>
+              <a:t>Goals: </a:t>
+            </a:r>
+          </a:p>
+          <a:p>
+            <a:pPr lvl="2"/>
+            <a:r>
+              <a:rPr lang="en-US" dirty="0" smtClean="0"/>
+              <a:t>Espionage: intellectual property theft, industrial espionage</a:t>
+            </a:r>
+          </a:p>
+          <a:p>
+            <a:pPr lvl="1"/>
+            <a:r>
+              <a:rPr lang="en-US" dirty="0" smtClean="0"/>
+              <a:t>Main target/concern: humans and organizations</a:t>
+            </a:r>
+          </a:p>
+          <a:p>
+            <a:pPr lvl="1"/>
+            <a:r>
+              <a:rPr lang="en-US" dirty="0" smtClean="0"/>
+              <a:t>Systems involved: servers and end-user devices, paper files, various security systems, physical security systems</a:t>
+            </a:r>
+            <a:endParaRPr lang="en-US" dirty="0"/>
+          </a:p>
+        </p:txBody>
+      </p:sp>
+    </p:spTree>
+    <p:extLst>
+      <p:ext uri="{BB962C8B-B14F-4D97-AF65-F5344CB8AC3E}">
+        <p14:creationId xmlns:p14="http://schemas.microsoft.com/office/powerpoint/2010/main" val="2843220369"/>
+      </p:ext>
+    </p:extLst>
+  </p:cSld>
+  <p:clrMapOvr>
+    <a:masterClrMapping/>
+  </p:clrMapOvr>
+</p:sld>
+</file>
+
+<file path=ppt/slides/slide25.xml><?xml version="1.0" encoding="utf-8"?>
+<p:sld xmlns:a="http://schemas.openxmlformats.org/drawingml/2006/main" xmlns:r="http://schemas.openxmlformats.org/officeDocument/2006/relationships" xmlns:p="http://schemas.openxmlformats.org/presentationml/2006/main">
+  <p:cSld>
+    <p:spTree>
+      <p:nvGrpSpPr>
+        <p:cNvPr id="1" name=""/>
+        <p:cNvGrpSpPr/>
+        <p:nvPr/>
+      </p:nvGrpSpPr>
+      <p:grpSpPr>
+        <a:xfrm>
+          <a:off x="0" y="0"/>
+          <a:ext cx="0" cy="0"/>
+          <a:chOff x="0" y="0"/>
+          <a:chExt cx="0" cy="0"/>
+        </a:xfrm>
+      </p:grpSpPr>
+      <p:sp>
+        <p:nvSpPr>
+          <p:cNvPr id="2" name="Title 1"/>
+          <p:cNvSpPr>
+            <a:spLocks noGrp="1"/>
+          </p:cNvSpPr>
+          <p:nvPr>
+            <p:ph type="title"/>
+          </p:nvPr>
+        </p:nvSpPr>
+        <p:spPr/>
+        <p:txBody>
+          <a:bodyPr/>
+          <a:lstStyle/>
+          <a:p>
+            <a:r>
               <a:rPr lang="en-US" dirty="0"/>
               <a:t>Use Case – Critical Infrastructure</a:t>
             </a:r>
@@ -4950,7 +5448,7 @@
 </p:sld>
 </file>
 
-<file path=ppt/slides/slide21.xml><?xml version="1.0" encoding="utf-8"?>
+<file path=ppt/slides/slide26.xml><?xml version="1.0" encoding="utf-8"?>
 <p:sld xmlns:a="http://schemas.openxmlformats.org/drawingml/2006/main" xmlns:r="http://schemas.openxmlformats.org/officeDocument/2006/relationships" xmlns:p="http://schemas.openxmlformats.org/presentationml/2006/main">
   <p:cSld>
     <p:spTree>
@@ -10624,6 +11122,13 @@
   <p:clrMapOvr>
     <a:masterClrMapping/>
   </p:clrMapOvr>
+  <p:timing>
+    <p:tnLst>
+      <p:par>
+        <p:cTn xmlns:p14="http://schemas.microsoft.com/office/powerpoint/2010/main" id="1" dur="indefinite" restart="never" nodeType="tmRoot"/>
+      </p:par>
+    </p:tnLst>
+  </p:timing>
 </p:sld>
 </file>
 
@@ -10644,58 +11149,52 @@
           <a:chExt cx="0" cy="0"/>
         </a:xfrm>
       </p:grpSpPr>
-      <p:sp>
-        <p:nvSpPr>
-          <p:cNvPr id="2" name="Title 1"/>
-          <p:cNvSpPr>
-            <a:spLocks noGrp="1"/>
-          </p:cNvSpPr>
-          <p:nvPr>
-            <p:ph type="title"/>
-          </p:nvPr>
-        </p:nvSpPr>
-        <p:spPr/>
-        <p:txBody>
-          <a:bodyPr/>
-          <a:lstStyle/>
-          <a:p>
-            <a:r>
-              <a:rPr lang="en-US" dirty="0" smtClean="0"/>
-              <a:t>Overview Mapping to STIX and NIEM</a:t>
-            </a:r>
-            <a:endParaRPr lang="en-US" dirty="0"/>
-          </a:p>
-        </p:txBody>
-      </p:sp>
-      <p:sp>
-        <p:nvSpPr>
-          <p:cNvPr id="3" name="Text Placeholder 2"/>
-          <p:cNvSpPr>
-            <a:spLocks noGrp="1"/>
-          </p:cNvSpPr>
-          <p:nvPr>
-            <p:ph type="body" idx="1"/>
-          </p:nvPr>
-        </p:nvSpPr>
-        <p:spPr/>
-        <p:txBody>
-          <a:bodyPr/>
-          <a:lstStyle/>
-          <a:p>
-            <a:endParaRPr lang="en-US"/>
-          </a:p>
-        </p:txBody>
-      </p:sp>
+      <p:pic>
+        <p:nvPicPr>
+          <p:cNvPr id="4" name="Picture 3" descr="Overview-20140326.jpg"/>
+          <p:cNvPicPr>
+            <a:picLocks noChangeAspect="1"/>
+          </p:cNvPicPr>
+          <p:nvPr/>
+        </p:nvPicPr>
+        <p:blipFill rotWithShape="1">
+          <a:blip r:embed="rId2">
+            <a:extLst>
+              <a:ext uri="{28A0092B-C50C-407E-A947-70E740481C1C}">
+                <a14:useLocalDpi xmlns:a14="http://schemas.microsoft.com/office/drawing/2010/main" val="0"/>
+              </a:ext>
+            </a:extLst>
+          </a:blip>
+          <a:srcRect l="1377" t="7827" r="2635" b="1672"/>
+          <a:stretch/>
+        </p:blipFill>
+        <p:spPr>
+          <a:xfrm>
+            <a:off x="41127" y="1"/>
+            <a:ext cx="9071115" cy="6858000"/>
+          </a:xfrm>
+          <a:prstGeom prst="rect">
+            <a:avLst/>
+          </a:prstGeom>
+        </p:spPr>
+      </p:pic>
     </p:spTree>
     <p:extLst>
       <p:ext uri="{BB962C8B-B14F-4D97-AF65-F5344CB8AC3E}">
-        <p14:creationId xmlns:p14="http://schemas.microsoft.com/office/powerpoint/2010/main" val="1784324374"/>
+        <p14:creationId xmlns:p14="http://schemas.microsoft.com/office/powerpoint/2010/main" val="2040873800"/>
       </p:ext>
     </p:extLst>
   </p:cSld>
   <p:clrMapOvr>
     <a:masterClrMapping/>
   </p:clrMapOvr>
+  <p:timing>
+    <p:tnLst>
+      <p:par>
+        <p:cTn xmlns:p14="http://schemas.microsoft.com/office/powerpoint/2010/main" id="1" dur="indefinite" restart="never" nodeType="tmRoot"/>
+      </p:par>
+    </p:tnLst>
+  </p:timing>
 </p:sld>
 </file>
 

</xml_diff>

<commit_message>
Slight update to OMG presentation
	modified:   docs/Threat Modeling and Sharing-20140326.pptx
</commit_message>
<xml_diff>
--- a/docs/Threat Modeling and Sharing-20140326.pptx
+++ b/docs/Threat Modeling and Sharing-20140326.pptx
@@ -217,7 +217,7 @@
           <a:p>
             <a:fld id="{CD9D57AB-A217-BA4E-940B-9038E8E64492}" type="datetimeFigureOut">
               <a:rPr lang="en-US" smtClean="0"/>
-              <a:t>3/26/14</a:t>
+              <a:t>3/27/14</a:t>
             </a:fld>
             <a:endParaRPr lang="en-US"/>
           </a:p>
@@ -666,7 +666,7 @@
           <a:p>
             <a:fld id="{063BF0F1-0BC3-6D4E-A19C-D840C0BB7B87}" type="datetimeFigureOut">
               <a:rPr lang="en-US" smtClean="0"/>
-              <a:t>3/26/14</a:t>
+              <a:t>3/27/14</a:t>
             </a:fld>
             <a:endParaRPr lang="en-US"/>
           </a:p>
@@ -836,7 +836,7 @@
           <a:p>
             <a:fld id="{063BF0F1-0BC3-6D4E-A19C-D840C0BB7B87}" type="datetimeFigureOut">
               <a:rPr lang="en-US" smtClean="0"/>
-              <a:t>3/26/14</a:t>
+              <a:t>3/27/14</a:t>
             </a:fld>
             <a:endParaRPr lang="en-US"/>
           </a:p>
@@ -1016,7 +1016,7 @@
           <a:p>
             <a:fld id="{063BF0F1-0BC3-6D4E-A19C-D840C0BB7B87}" type="datetimeFigureOut">
               <a:rPr lang="en-US" smtClean="0"/>
-              <a:t>3/26/14</a:t>
+              <a:t>3/27/14</a:t>
             </a:fld>
             <a:endParaRPr lang="en-US"/>
           </a:p>
@@ -1186,7 +1186,7 @@
           <a:p>
             <a:fld id="{063BF0F1-0BC3-6D4E-A19C-D840C0BB7B87}" type="datetimeFigureOut">
               <a:rPr lang="en-US" smtClean="0"/>
-              <a:t>3/26/14</a:t>
+              <a:t>3/27/14</a:t>
             </a:fld>
             <a:endParaRPr lang="en-US"/>
           </a:p>
@@ -1432,7 +1432,7 @@
           <a:p>
             <a:fld id="{063BF0F1-0BC3-6D4E-A19C-D840C0BB7B87}" type="datetimeFigureOut">
               <a:rPr lang="en-US" smtClean="0"/>
-              <a:t>3/26/14</a:t>
+              <a:t>3/27/14</a:t>
             </a:fld>
             <a:endParaRPr lang="en-US"/>
           </a:p>
@@ -1720,7 +1720,7 @@
           <a:p>
             <a:fld id="{063BF0F1-0BC3-6D4E-A19C-D840C0BB7B87}" type="datetimeFigureOut">
               <a:rPr lang="en-US" smtClean="0"/>
-              <a:t>3/26/14</a:t>
+              <a:t>3/27/14</a:t>
             </a:fld>
             <a:endParaRPr lang="en-US"/>
           </a:p>
@@ -2142,7 +2142,7 @@
           <a:p>
             <a:fld id="{063BF0F1-0BC3-6D4E-A19C-D840C0BB7B87}" type="datetimeFigureOut">
               <a:rPr lang="en-US" smtClean="0"/>
-              <a:t>3/26/14</a:t>
+              <a:t>3/27/14</a:t>
             </a:fld>
             <a:endParaRPr lang="en-US"/>
           </a:p>
@@ -2260,7 +2260,7 @@
           <a:p>
             <a:fld id="{063BF0F1-0BC3-6D4E-A19C-D840C0BB7B87}" type="datetimeFigureOut">
               <a:rPr lang="en-US" smtClean="0"/>
-              <a:t>3/26/14</a:t>
+              <a:t>3/27/14</a:t>
             </a:fld>
             <a:endParaRPr lang="en-US"/>
           </a:p>
@@ -2355,7 +2355,7 @@
           <a:p>
             <a:fld id="{063BF0F1-0BC3-6D4E-A19C-D840C0BB7B87}" type="datetimeFigureOut">
               <a:rPr lang="en-US" smtClean="0"/>
-              <a:t>3/26/14</a:t>
+              <a:t>3/27/14</a:t>
             </a:fld>
             <a:endParaRPr lang="en-US"/>
           </a:p>
@@ -2632,7 +2632,7 @@
           <a:p>
             <a:fld id="{063BF0F1-0BC3-6D4E-A19C-D840C0BB7B87}" type="datetimeFigureOut">
               <a:rPr lang="en-US" smtClean="0"/>
-              <a:t>3/26/14</a:t>
+              <a:t>3/27/14</a:t>
             </a:fld>
             <a:endParaRPr lang="en-US"/>
           </a:p>
@@ -2885,7 +2885,7 @@
           <a:p>
             <a:fld id="{063BF0F1-0BC3-6D4E-A19C-D840C0BB7B87}" type="datetimeFigureOut">
               <a:rPr lang="en-US" smtClean="0"/>
-              <a:t>3/26/14</a:t>
+              <a:t>3/27/14</a:t>
             </a:fld>
             <a:endParaRPr lang="en-US"/>
           </a:p>
@@ -3098,7 +3098,7 @@
           <a:p>
             <a:fld id="{063BF0F1-0BC3-6D4E-A19C-D840C0BB7B87}" type="datetimeFigureOut">
               <a:rPr lang="en-US" smtClean="0"/>
-              <a:t>3/26/14</a:t>
+              <a:t>3/27/14</a:t>
             </a:fld>
             <a:endParaRPr lang="en-US"/>
           </a:p>
@@ -3518,19 +3518,7 @@
           <a:p>
             <a:r>
               <a:rPr lang="en-US" dirty="0" smtClean="0"/>
-              <a:t>Gerald </a:t>
-            </a:r>
-            <a:r>
-              <a:rPr lang="en-US" dirty="0" smtClean="0"/>
-              <a:t>Beuchelt, Demandware</a:t>
-            </a:r>
-            <a:r>
-              <a:rPr lang="en-US" dirty="0" smtClean="0"/>
-              <a:t>, Inc</a:t>
-            </a:r>
-            <a:r>
-              <a:rPr lang="en-US" dirty="0" smtClean="0"/>
-              <a:t>.</a:t>
+              <a:t>Gerald Beuchelt, Demandware, Inc.</a:t>
             </a:r>
           </a:p>
           <a:p>
@@ -3864,6 +3852,13 @@
   <p:clrMapOvr>
     <a:masterClrMapping/>
   </p:clrMapOvr>
+  <p:timing>
+    <p:tnLst>
+      <p:par>
+        <p:cTn xmlns:p14="http://schemas.microsoft.com/office/powerpoint/2010/main" id="1" dur="indefinite" restart="never" nodeType="tmRoot"/>
+      </p:par>
+    </p:tnLst>
+  </p:timing>
 </p:sld>
 </file>
 
@@ -4344,13 +4339,7 @@
               <a:rPr lang="en-US" dirty="0" smtClean="0">
                 <a:hlinkClick r:id="rId2"/>
               </a:rPr>
-              <a:t>threat-modeling@</a:t>
-            </a:r>
-            <a:r>
-              <a:rPr lang="en-US" dirty="0" smtClean="0">
-                <a:hlinkClick r:id="rId2"/>
-              </a:rPr>
-              <a:t>omg.org</a:t>
+              <a:t>threat-modeling@omg.org</a:t>
             </a:r>
             <a:r>
               <a:rPr lang="en-US" dirty="0"/>
@@ -4361,11 +4350,7 @@
             </a:br>
             <a:r>
               <a:rPr lang="en-US" dirty="0" smtClean="0"/>
-              <a:t>(</a:t>
-            </a:r>
-            <a:r>
-              <a:rPr lang="en-US" dirty="0" smtClean="0"/>
-              <a:t>Subscription via </a:t>
+              <a:t>(Subscription via </a:t>
             </a:r>
             <a:r>
               <a:rPr lang="en-US" dirty="0" smtClean="0">
@@ -4385,11 +4370,7 @@
             </a:r>
             <a:r>
               <a:rPr lang="en-US" dirty="0" smtClean="0"/>
-              <a:t> </a:t>
-            </a:r>
-            <a:r>
-              <a:rPr lang="en-US" dirty="0" smtClean="0"/>
-              <a:t>Pages</a:t>
+              <a:t> Pages</a:t>
             </a:r>
             <a:br>
               <a:rPr lang="en-US" dirty="0" smtClean="0"/>
@@ -4424,11 +4405,11 @@
             </a:r>
             <a:r>
               <a:rPr lang="en-US" dirty="0"/>
-              <a:t>calls: Mondays, 1pm </a:t>
-            </a:r>
-            <a:r>
-              <a:rPr lang="en-US" dirty="0" smtClean="0"/>
-              <a:t>ET</a:t>
+              <a:t>calls: Mondays, </a:t>
+            </a:r>
+            <a:r>
+              <a:rPr lang="en-US" dirty="0" smtClean="0"/>
+              <a:t>2 pm ET</a:t>
             </a:r>
             <a:endParaRPr lang="en-US" dirty="0"/>
           </a:p>
@@ -4486,6 +4467,13 @@
   <p:clrMapOvr>
     <a:masterClrMapping/>
   </p:clrMapOvr>
+  <p:timing>
+    <p:tnLst>
+      <p:par>
+        <p:cTn xmlns:p14="http://schemas.microsoft.com/office/powerpoint/2010/main" id="1" dur="indefinite" restart="never" nodeType="tmRoot"/>
+      </p:par>
+    </p:tnLst>
+  </p:timing>
 </p:sld>
 </file>
 
@@ -4558,6 +4546,13 @@
   <p:clrMapOvr>
     <a:masterClrMapping/>
   </p:clrMapOvr>
+  <p:timing>
+    <p:tnLst>
+      <p:par>
+        <p:cTn xmlns:p14="http://schemas.microsoft.com/office/powerpoint/2010/main" id="1" dur="indefinite" restart="never" nodeType="tmRoot"/>
+      </p:par>
+    </p:tnLst>
+  </p:timing>
 </p:sld>
 </file>
 
@@ -4641,24 +4636,14 @@
             <a:pPr lvl="1"/>
             <a:r>
               <a:rPr lang="en-US" dirty="0" smtClean="0"/>
-              <a:t>Expand </a:t>
-            </a:r>
-            <a:r>
-              <a:rPr lang="en-US" dirty="0" smtClean="0"/>
-              <a:t>to non-cyber </a:t>
-            </a:r>
-            <a:r>
-              <a:rPr lang="en-US" dirty="0" smtClean="0"/>
-              <a:t>domains</a:t>
-            </a:r>
-            <a:endParaRPr lang="en-US" dirty="0" smtClean="0"/>
+              <a:t>Expand to non-cyber domains</a:t>
+            </a:r>
           </a:p>
           <a:p>
             <a:r>
               <a:rPr lang="en-US" dirty="0" smtClean="0"/>
               <a:t>Progress so far</a:t>
             </a:r>
-            <a:endParaRPr lang="en-US" dirty="0" smtClean="0"/>
           </a:p>
           <a:p>
             <a:pPr lvl="1"/>
@@ -4671,9 +4656,16 @@
             <a:pPr lvl="1"/>
             <a:r>
               <a:rPr lang="en-US" dirty="0" smtClean="0"/>
-              <a:t>Developed initial conceptual thread model</a:t>
-            </a:r>
-            <a:endParaRPr lang="en-US" dirty="0" smtClean="0"/>
+              <a:t>Developed initial conceptual </a:t>
+            </a:r>
+            <a:r>
+              <a:rPr lang="en-US" dirty="0" smtClean="0"/>
+              <a:t>threat </a:t>
+            </a:r>
+            <a:r>
+              <a:rPr lang="en-US" dirty="0" smtClean="0"/>
+              <a:t>model</a:t>
+            </a:r>
           </a:p>
           <a:p>
             <a:pPr lvl="1"/>
@@ -4681,7 +4673,6 @@
               <a:rPr lang="en-US" dirty="0" smtClean="0"/>
               <a:t>Some basic mappings from NIEM to STIX by ‘pivoting’ through conceptual model</a:t>
             </a:r>
-            <a:endParaRPr lang="en-US" dirty="0" smtClean="0"/>
           </a:p>
           <a:p>
             <a:r>
@@ -4869,6 +4860,13 @@
   <p:clrMapOvr>
     <a:masterClrMapping/>
   </p:clrMapOvr>
+  <p:timing>
+    <p:tnLst>
+      <p:par>
+        <p:cTn xmlns:p14="http://schemas.microsoft.com/office/powerpoint/2010/main" id="1" dur="indefinite" restart="never" nodeType="tmRoot"/>
+      </p:par>
+    </p:tnLst>
+  </p:timing>
 </p:sld>
 </file>
 
@@ -5609,11 +5607,7 @@
           <a:p>
             <a:r>
               <a:rPr lang="en-US" dirty="0" smtClean="0"/>
-              <a:t>Cross-Protocol</a:t>
-            </a:r>
-            <a:r>
-              <a:rPr lang="en-US" dirty="0" smtClean="0"/>
-              <a:t>/Conceptual Model</a:t>
+              <a:t>Cross-Protocol/Conceptual Model</a:t>
             </a:r>
             <a:endParaRPr lang="en-US" dirty="0"/>
           </a:p>
@@ -5708,6 +5702,13 @@
   <p:clrMapOvr>
     <a:masterClrMapping/>
   </p:clrMapOvr>
+  <p:timing>
+    <p:tnLst>
+      <p:par>
+        <p:cTn xmlns:p14="http://schemas.microsoft.com/office/powerpoint/2010/main" id="1" dur="indefinite" restart="never" nodeType="tmRoot"/>
+      </p:par>
+    </p:tnLst>
+  </p:timing>
 </p:sld>
 </file>
 
@@ -7435,6 +7436,13 @@
   <p:clrMapOvr>
     <a:masterClrMapping/>
   </p:clrMapOvr>
+  <p:timing>
+    <p:tnLst>
+      <p:par>
+        <p:cTn xmlns:p14="http://schemas.microsoft.com/office/powerpoint/2010/main" id="1" dur="indefinite" restart="never" nodeType="tmRoot"/>
+      </p:par>
+    </p:tnLst>
+  </p:timing>
 </p:sld>
 </file>
 
@@ -8971,7 +8979,7 @@
             </a:br>
             <a:r>
               <a:rPr lang="en-US" dirty="0" smtClean="0"/>
-              <a:t>No Common Meta Model</a:t>
+              <a:t>Conceptual Domain Model</a:t>
             </a:r>
             <a:endParaRPr lang="en-US" dirty="0"/>
           </a:p>
@@ -9039,6 +9047,13 @@
   <p:clrMapOvr>
     <a:masterClrMapping/>
   </p:clrMapOvr>
+  <p:timing>
+    <p:tnLst>
+      <p:par>
+        <p:cTn xmlns:p14="http://schemas.microsoft.com/office/powerpoint/2010/main" id="1" dur="indefinite" restart="never" nodeType="tmRoot"/>
+      </p:par>
+    </p:tnLst>
+  </p:timing>
 </p:sld>
 </file>
 
@@ -9284,7 +9299,7 @@
         </p:spPr>
         <p:txBody>
           <a:bodyPr>
-            <a:normAutofit fontScale="47500" lnSpcReduction="20000"/>
+            <a:normAutofit fontScale="77500" lnSpcReduction="20000"/>
           </a:bodyPr>
           <a:lstStyle/>
           <a:p>
@@ -9669,6 +9684,13 @@
   <p:clrMapOvr>
     <a:masterClrMapping/>
   </p:clrMapOvr>
+  <p:timing>
+    <p:tnLst>
+      <p:par>
+        <p:cTn xmlns:p14="http://schemas.microsoft.com/office/powerpoint/2010/main" id="1" dur="indefinite" restart="never" nodeType="tmRoot"/>
+      </p:par>
+    </p:tnLst>
+  </p:timing>
 </p:sld>
 </file>
 
@@ -10779,7 +10801,7 @@
         </p:spPr>
         <p:txBody>
           <a:bodyPr>
-            <a:normAutofit fontScale="47500" lnSpcReduction="20000"/>
+            <a:normAutofit fontScale="77500" lnSpcReduction="20000"/>
           </a:bodyPr>
           <a:lstStyle/>
           <a:p>

</xml_diff>